<commit_message>
Aggiornamento ulteriore sulla presentazione
</commit_message>
<xml_diff>
--- a/presentazione.pptx
+++ b/presentazione.pptx
@@ -1034,7 +1034,7 @@
           <a:bodyPr/>
           <a:lstStyle/>
           <a:p>
-            <a:fld id="{84239772-C33B-4D72-8734-B8D1303541B2}" type="datetime1">
+            <a:fld id="{406A2CA4-CF9F-4D6B-896C-705236384917}" type="datetime1">
               <a:rPr lang="en-US" smtClean="0"/>
               <a:t>6/20/2020</a:t>
             </a:fld>
@@ -1493,7 +1493,7 @@
             </a:lvl1pPr>
           </a:lstStyle>
           <a:p>
-            <a:fld id="{4C4D76AC-BD49-48A7-8314-2C6390BCB40F}" type="datetime1">
+            <a:fld id="{E4D457AD-4150-436F-9174-87F56CCB1892}" type="datetime1">
               <a:rPr lang="en-US" smtClean="0"/>
               <a:t>6/20/2020</a:t>
             </a:fld>
@@ -2245,35 +2245,6 @@
           </a:prstGeom>
         </p:spPr>
       </p:pic>
-      <p:sp>
-        <p:nvSpPr>
-          <p:cNvPr id="4" name="Segnaposto numero diapositiva 3">
-            <a:extLst>
-              <a:ext uri="{FF2B5EF4-FFF2-40B4-BE49-F238E27FC236}">
-                <a16:creationId xmlns:a16="http://schemas.microsoft.com/office/drawing/2014/main" id="{FC2961BE-480D-43F3-BE0F-BB990EBA96E6}"/>
-              </a:ext>
-            </a:extLst>
-          </p:cNvPr>
-          <p:cNvSpPr>
-            <a:spLocks noGrp="1"/>
-          </p:cNvSpPr>
-          <p:nvPr>
-            <p:ph type="sldNum" sz="quarter" idx="12"/>
-          </p:nvPr>
-        </p:nvSpPr>
-        <p:spPr/>
-        <p:txBody>
-          <a:bodyPr/>
-          <a:lstStyle/>
-          <a:p>
-            <a:fld id="{4854181D-6920-4594-9A5D-6CE56DC9F8B2}" type="slidenum">
-              <a:rPr lang="en-US" smtClean="0"/>
-              <a:t>1</a:t>
-            </a:fld>
-            <a:endParaRPr lang="en-US"/>
-          </a:p>
-        </p:txBody>
-      </p:sp>
     </p:spTree>
     <p:extLst>
       <p:ext uri="{BB962C8B-B14F-4D97-AF65-F5344CB8AC3E}">
@@ -2462,8 +2433,8 @@
           </a:p>
         </p:txBody>
       </p:sp>
-      <mc:AlternateContent xmlns:mc="http://schemas.openxmlformats.org/markup-compatibility/2006">
-        <mc:Choice xmlns:a14="http://schemas.microsoft.com/office/drawing/2010/main" Requires="a14">
+      <mc:AlternateContent xmlns:mc="http://schemas.openxmlformats.org/markup-compatibility/2006" xmlns:a14="http://schemas.microsoft.com/office/drawing/2010/main">
+        <mc:Choice Requires="a14">
           <p:sp>
             <p:nvSpPr>
               <p:cNvPr id="38" name="CasellaDiTesto 37">
@@ -3238,7 +3209,7 @@
             </p:txBody>
           </p:sp>
         </mc:Choice>
-        <mc:Fallback>
+        <mc:Fallback xmlns="">
           <p:sp>
             <p:nvSpPr>
               <p:cNvPr id="38" name="CasellaDiTesto 37">
@@ -3357,35 +3328,6 @@
       </p:pic>
       <p:sp>
         <p:nvSpPr>
-          <p:cNvPr id="2" name="Segnaposto numero diapositiva 1">
-            <a:extLst>
-              <a:ext uri="{FF2B5EF4-FFF2-40B4-BE49-F238E27FC236}">
-                <a16:creationId xmlns:a16="http://schemas.microsoft.com/office/drawing/2014/main" id="{4837F35C-5785-4D6E-8BA2-80AFF8B6D6F8}"/>
-              </a:ext>
-            </a:extLst>
-          </p:cNvPr>
-          <p:cNvSpPr>
-            <a:spLocks noGrp="1"/>
-          </p:cNvSpPr>
-          <p:nvPr>
-            <p:ph type="sldNum" sz="quarter" idx="12"/>
-          </p:nvPr>
-        </p:nvSpPr>
-        <p:spPr/>
-        <p:txBody>
-          <a:bodyPr/>
-          <a:lstStyle/>
-          <a:p>
-            <a:fld id="{4854181D-6920-4594-9A5D-6CE56DC9F8B2}" type="slidenum">
-              <a:rPr lang="en-US" smtClean="0"/>
-              <a:t>10</a:t>
-            </a:fld>
-            <a:endParaRPr lang="en-US"/>
-          </a:p>
-        </p:txBody>
-      </p:sp>
-      <p:sp>
-        <p:nvSpPr>
           <p:cNvPr id="5" name="CasellaDiTesto 4">
             <a:extLst>
               <a:ext uri="{FF2B5EF4-FFF2-40B4-BE49-F238E27FC236}">
@@ -3469,6 +3411,35 @@
               </a:rPr>
               <a:t>Lamb, 1945</a:t>
             </a:r>
+          </a:p>
+        </p:txBody>
+      </p:sp>
+      <p:sp>
+        <p:nvSpPr>
+          <p:cNvPr id="8" name="Segnaposto numero diapositiva 7">
+            <a:extLst>
+              <a:ext uri="{FF2B5EF4-FFF2-40B4-BE49-F238E27FC236}">
+                <a16:creationId xmlns:a16="http://schemas.microsoft.com/office/drawing/2014/main" id="{D0A01893-DAEE-4311-AFFE-98A287E87F4E}"/>
+              </a:ext>
+            </a:extLst>
+          </p:cNvPr>
+          <p:cNvSpPr>
+            <a:spLocks noGrp="1"/>
+          </p:cNvSpPr>
+          <p:nvPr>
+            <p:ph type="sldNum" sz="quarter" idx="12"/>
+          </p:nvPr>
+        </p:nvSpPr>
+        <p:spPr/>
+        <p:txBody>
+          <a:bodyPr/>
+          <a:lstStyle/>
+          <a:p>
+            <a:fld id="{4854181D-6920-4594-9A5D-6CE56DC9F8B2}" type="slidenum">
+              <a:rPr lang="en-US" smtClean="0"/>
+              <a:t>10</a:t>
+            </a:fld>
+            <a:endParaRPr lang="en-US"/>
           </a:p>
         </p:txBody>
       </p:sp>
@@ -3694,35 +3665,6 @@
           </a:prstGeom>
         </p:spPr>
       </p:pic>
-      <p:sp>
-        <p:nvSpPr>
-          <p:cNvPr id="2" name="Segnaposto numero diapositiva 1">
-            <a:extLst>
-              <a:ext uri="{FF2B5EF4-FFF2-40B4-BE49-F238E27FC236}">
-                <a16:creationId xmlns:a16="http://schemas.microsoft.com/office/drawing/2014/main" id="{32E2FB2F-8F7C-4915-8F14-182849432571}"/>
-              </a:ext>
-            </a:extLst>
-          </p:cNvPr>
-          <p:cNvSpPr>
-            <a:spLocks noGrp="1"/>
-          </p:cNvSpPr>
-          <p:nvPr>
-            <p:ph type="sldNum" sz="quarter" idx="12"/>
-          </p:nvPr>
-        </p:nvSpPr>
-        <p:spPr/>
-        <p:txBody>
-          <a:bodyPr/>
-          <a:lstStyle/>
-          <a:p>
-            <a:fld id="{4854181D-6920-4594-9A5D-6CE56DC9F8B2}" type="slidenum">
-              <a:rPr lang="en-US" smtClean="0"/>
-              <a:t>11</a:t>
-            </a:fld>
-            <a:endParaRPr lang="en-US"/>
-          </a:p>
-        </p:txBody>
-      </p:sp>
       <p:pic>
         <p:nvPicPr>
           <p:cNvPr id="5" name="Immagine 4" descr="Immagine che contiene orologio&#10;&#10;Descrizione generata automaticamente">
@@ -3759,6 +3701,35 @@
           </a:prstGeom>
         </p:spPr>
       </p:pic>
+      <p:sp>
+        <p:nvSpPr>
+          <p:cNvPr id="3" name="Segnaposto numero diapositiva 2">
+            <a:extLst>
+              <a:ext uri="{FF2B5EF4-FFF2-40B4-BE49-F238E27FC236}">
+                <a16:creationId xmlns:a16="http://schemas.microsoft.com/office/drawing/2014/main" id="{2CF8711D-4C81-446A-BFC9-15237AC80147}"/>
+              </a:ext>
+            </a:extLst>
+          </p:cNvPr>
+          <p:cNvSpPr>
+            <a:spLocks noGrp="1"/>
+          </p:cNvSpPr>
+          <p:nvPr>
+            <p:ph type="sldNum" sz="quarter" idx="12"/>
+          </p:nvPr>
+        </p:nvSpPr>
+        <p:spPr/>
+        <p:txBody>
+          <a:bodyPr/>
+          <a:lstStyle/>
+          <a:p>
+            <a:fld id="{4854181D-6920-4594-9A5D-6CE56DC9F8B2}" type="slidenum">
+              <a:rPr lang="en-US" smtClean="0"/>
+              <a:t>11</a:t>
+            </a:fld>
+            <a:endParaRPr lang="en-US"/>
+          </a:p>
+        </p:txBody>
+      </p:sp>
     </p:spTree>
     <p:extLst>
       <p:ext uri="{BB962C8B-B14F-4D97-AF65-F5344CB8AC3E}">
@@ -3971,7 +3942,7 @@
             <p:spPr>
               <a:xfrm>
                 <a:off x="1196502" y="2101134"/>
-                <a:ext cx="6157609" cy="2034403"/>
+                <a:ext cx="6157609" cy="2196435"/>
               </a:xfrm>
               <a:prstGeom prst="rect">
                 <a:avLst/>
@@ -4034,21 +4005,133 @@
                   </a:rPr>
                   <a:t>Calcolo di Re a 20 °C, con </a:t>
                 </a:r>
-                <a:r>
-                  <a:rPr lang="el-GR" dirty="0">
-                    <a:solidFill>
-                      <a:schemeClr val="bg1"/>
-                    </a:solidFill>
-                  </a:rPr>
-                  <a:t>ρ</a:t>
-                </a:r>
+                <a14:m>
+                  <m:oMath xmlns:m="http://schemas.openxmlformats.org/officeDocument/2006/math">
+                    <m:sSub>
+                      <m:sSubPr>
+                        <m:ctrlPr>
+                          <a:rPr lang="it-IT" i="1" dirty="0" smtClean="0">
+                            <a:solidFill>
+                              <a:schemeClr val="bg1"/>
+                            </a:solidFill>
+                            <a:latin typeface="Cambria Math" panose="02040503050406030204" pitchFamily="18" charset="0"/>
+                          </a:rPr>
+                        </m:ctrlPr>
+                      </m:sSubPr>
+                      <m:e>
+                        <m:r>
+                          <a:rPr lang="el-GR" i="1" dirty="0">
+                            <a:solidFill>
+                              <a:schemeClr val="bg1"/>
+                            </a:solidFill>
+                            <a:latin typeface="Cambria Math" panose="02040503050406030204" pitchFamily="18" charset="0"/>
+                          </a:rPr>
+                          <m:t>𝜌</m:t>
+                        </m:r>
+                      </m:e>
+                      <m:sub>
+                        <m:r>
+                          <a:rPr lang="it-IT" i="1" dirty="0">
+                            <a:solidFill>
+                              <a:schemeClr val="bg1"/>
+                            </a:solidFill>
+                            <a:latin typeface="Cambria Math" panose="02040503050406030204" pitchFamily="18" charset="0"/>
+                          </a:rPr>
+                          <m:t>𝑎𝑐𝑞𝑢𝑎</m:t>
+                        </m:r>
+                      </m:sub>
+                    </m:sSub>
+                    <m:r>
+                      <m:rPr>
+                        <m:nor/>
+                      </m:rPr>
+                      <a:rPr lang="it-IT" b="0" i="0" dirty="0" smtClean="0">
+                        <a:solidFill>
+                          <a:schemeClr val="bg1"/>
+                        </a:solidFill>
+                        <a:latin typeface="Cambria Math" panose="02040503050406030204" pitchFamily="18" charset="0"/>
+                      </a:rPr>
+                      <m:t> </m:t>
+                    </m:r>
+                    <m:r>
+                      <m:rPr>
+                        <m:nor/>
+                      </m:rPr>
+                      <a:rPr lang="it-IT" dirty="0">
+                        <a:solidFill>
+                          <a:schemeClr val="bg1"/>
+                        </a:solidFill>
+                      </a:rPr>
+                      <m:t>= 1030 </m:t>
+                    </m:r>
+                    <m:f>
+                      <m:fPr>
+                        <m:ctrlPr>
+                          <a:rPr lang="it-IT" i="1" dirty="0" smtClean="0">
+                            <a:solidFill>
+                              <a:schemeClr val="bg1"/>
+                            </a:solidFill>
+                            <a:latin typeface="Cambria Math" panose="02040503050406030204" pitchFamily="18" charset="0"/>
+                          </a:rPr>
+                        </m:ctrlPr>
+                      </m:fPr>
+                      <m:num>
+                        <m:r>
+                          <a:rPr lang="it-IT" b="0" i="1" dirty="0" smtClean="0">
+                            <a:solidFill>
+                              <a:schemeClr val="bg1"/>
+                            </a:solidFill>
+                            <a:latin typeface="Cambria Math" panose="02040503050406030204" pitchFamily="18" charset="0"/>
+                          </a:rPr>
+                          <m:t>𝑘𝑔</m:t>
+                        </m:r>
+                      </m:num>
+                      <m:den>
+                        <m:sSup>
+                          <m:sSupPr>
+                            <m:ctrlPr>
+                              <a:rPr lang="it-IT" i="1" dirty="0" smtClean="0">
+                                <a:solidFill>
+                                  <a:schemeClr val="bg1"/>
+                                </a:solidFill>
+                                <a:latin typeface="Cambria Math" panose="02040503050406030204" pitchFamily="18" charset="0"/>
+                              </a:rPr>
+                            </m:ctrlPr>
+                          </m:sSupPr>
+                          <m:e>
+                            <m:r>
+                              <a:rPr lang="it-IT" b="0" i="1" dirty="0" smtClean="0">
+                                <a:solidFill>
+                                  <a:schemeClr val="bg1"/>
+                                </a:solidFill>
+                                <a:latin typeface="Cambria Math" panose="02040503050406030204" pitchFamily="18" charset="0"/>
+                              </a:rPr>
+                              <m:t>𝑚</m:t>
+                            </m:r>
+                          </m:e>
+                          <m:sup>
+                            <m:r>
+                              <a:rPr lang="it-IT" b="0" i="1" dirty="0" smtClean="0">
+                                <a:solidFill>
+                                  <a:schemeClr val="bg1"/>
+                                </a:solidFill>
+                                <a:latin typeface="Cambria Math" panose="02040503050406030204" pitchFamily="18" charset="0"/>
+                              </a:rPr>
+                              <m:t>3</m:t>
+                            </m:r>
+                          </m:sup>
+                        </m:sSup>
+                      </m:den>
+                    </m:f>
+                  </m:oMath>
+                </a14:m>
                 <a:r>
                   <a:rPr lang="it-IT" dirty="0">
                     <a:solidFill>
                       <a:schemeClr val="bg1"/>
                     </a:solidFill>
                   </a:rPr>
-                  <a:t>acqua = 1030 kg/m3 e per una velocità di 0.3 m/s → </a:t>
+                  <a:t> e per una velocità di 0.3 m/s → </a:t>
                 </a:r>
                 <a14:m>
                   <m:oMath xmlns:m="http://schemas.openxmlformats.org/officeDocument/2006/math">
@@ -4180,7 +4263,7 @@
             <p:spPr>
               <a:xfrm>
                 <a:off x="1196502" y="2101134"/>
-                <a:ext cx="6157609" cy="2034403"/>
+                <a:ext cx="6157609" cy="2196435"/>
               </a:xfrm>
               <a:prstGeom prst="rect">
                 <a:avLst/>
@@ -4188,7 +4271,7 @@
               <a:blipFill>
                 <a:blip r:embed="rId4"/>
                 <a:stretch>
-                  <a:fillRect l="-891" t="-1502" b="-4204"/>
+                  <a:fillRect l="-891" t="-1389" r="-594" b="-1944"/>
                 </a:stretch>
               </a:blipFill>
             </p:spPr>
@@ -4245,10 +4328,10 @@
       </p:pic>
       <p:sp>
         <p:nvSpPr>
-          <p:cNvPr id="3" name="Segnaposto numero diapositiva 2">
+          <p:cNvPr id="2" name="Segnaposto numero diapositiva 1">
             <a:extLst>
               <a:ext uri="{FF2B5EF4-FFF2-40B4-BE49-F238E27FC236}">
-                <a16:creationId xmlns:a16="http://schemas.microsoft.com/office/drawing/2014/main" id="{C9C30014-545C-4A40-85DD-EEF2478DFD9F}"/>
+                <a16:creationId xmlns:a16="http://schemas.microsoft.com/office/drawing/2014/main" id="{2258A93B-DC81-4A28-9D9B-DB918C94D673}"/>
               </a:ext>
             </a:extLst>
           </p:cNvPr>
@@ -4689,35 +4772,6 @@
           </a:prstGeom>
         </p:spPr>
       </p:pic>
-      <p:sp>
-        <p:nvSpPr>
-          <p:cNvPr id="6" name="Segnaposto numero diapositiva 5">
-            <a:extLst>
-              <a:ext uri="{FF2B5EF4-FFF2-40B4-BE49-F238E27FC236}">
-                <a16:creationId xmlns:a16="http://schemas.microsoft.com/office/drawing/2014/main" id="{74C45054-7913-4C13-B7DB-69CBC3E69928}"/>
-              </a:ext>
-            </a:extLst>
-          </p:cNvPr>
-          <p:cNvSpPr>
-            <a:spLocks noGrp="1"/>
-          </p:cNvSpPr>
-          <p:nvPr>
-            <p:ph type="sldNum" sz="quarter" idx="12"/>
-          </p:nvPr>
-        </p:nvSpPr>
-        <p:spPr/>
-        <p:txBody>
-          <a:bodyPr/>
-          <a:lstStyle/>
-          <a:p>
-            <a:fld id="{4854181D-6920-4594-9A5D-6CE56DC9F8B2}" type="slidenum">
-              <a:rPr lang="en-US" smtClean="0"/>
-              <a:t>13</a:t>
-            </a:fld>
-            <a:endParaRPr lang="en-US"/>
-          </a:p>
-        </p:txBody>
-      </p:sp>
       <p:pic>
         <p:nvPicPr>
           <p:cNvPr id="13" name="Immagine 12" descr="Immagine che contiene disegnando, orologio&#10;&#10;Descrizione generata automaticamente">
@@ -4754,6 +4808,35 @@
           </a:prstGeom>
         </p:spPr>
       </p:pic>
+      <p:sp>
+        <p:nvSpPr>
+          <p:cNvPr id="5" name="Segnaposto numero diapositiva 4">
+            <a:extLst>
+              <a:ext uri="{FF2B5EF4-FFF2-40B4-BE49-F238E27FC236}">
+                <a16:creationId xmlns:a16="http://schemas.microsoft.com/office/drawing/2014/main" id="{927F117E-DCAA-45EB-9315-286A3870120E}"/>
+              </a:ext>
+            </a:extLst>
+          </p:cNvPr>
+          <p:cNvSpPr>
+            <a:spLocks noGrp="1"/>
+          </p:cNvSpPr>
+          <p:nvPr>
+            <p:ph type="sldNum" sz="quarter" idx="12"/>
+          </p:nvPr>
+        </p:nvSpPr>
+        <p:spPr/>
+        <p:txBody>
+          <a:bodyPr/>
+          <a:lstStyle/>
+          <a:p>
+            <a:fld id="{4854181D-6920-4594-9A5D-6CE56DC9F8B2}" type="slidenum">
+              <a:rPr lang="en-US" smtClean="0"/>
+              <a:t>13</a:t>
+            </a:fld>
+            <a:endParaRPr lang="en-US"/>
+          </a:p>
+        </p:txBody>
+      </p:sp>
     </p:spTree>
     <p:extLst>
       <p:ext uri="{BB962C8B-B14F-4D97-AF65-F5344CB8AC3E}">
@@ -4870,35 +4953,6 @@
           </a:p>
         </p:txBody>
       </p:sp>
-      <p:sp>
-        <p:nvSpPr>
-          <p:cNvPr id="3" name="Segnaposto numero diapositiva 2">
-            <a:extLst>
-              <a:ext uri="{FF2B5EF4-FFF2-40B4-BE49-F238E27FC236}">
-                <a16:creationId xmlns:a16="http://schemas.microsoft.com/office/drawing/2014/main" id="{9D4E6BFE-F9D6-4BAF-80BD-1D493B0A098A}"/>
-              </a:ext>
-            </a:extLst>
-          </p:cNvPr>
-          <p:cNvSpPr>
-            <a:spLocks noGrp="1"/>
-          </p:cNvSpPr>
-          <p:nvPr>
-            <p:ph type="sldNum" sz="quarter" idx="12"/>
-          </p:nvPr>
-        </p:nvSpPr>
-        <p:spPr/>
-        <p:txBody>
-          <a:bodyPr/>
-          <a:lstStyle/>
-          <a:p>
-            <a:fld id="{4854181D-6920-4594-9A5D-6CE56DC9F8B2}" type="slidenum">
-              <a:rPr lang="en-US" smtClean="0"/>
-              <a:t>14</a:t>
-            </a:fld>
-            <a:endParaRPr lang="en-US"/>
-          </a:p>
-        </p:txBody>
-      </p:sp>
       <p:pic>
         <p:nvPicPr>
           <p:cNvPr id="6" name="Immagine 5" descr="Immagine che contiene screenshot&#10;&#10;Descrizione generata automaticamente">
@@ -4935,6 +4989,35 @@
           </a:prstGeom>
         </p:spPr>
       </p:pic>
+      <p:sp>
+        <p:nvSpPr>
+          <p:cNvPr id="2" name="Segnaposto numero diapositiva 1">
+            <a:extLst>
+              <a:ext uri="{FF2B5EF4-FFF2-40B4-BE49-F238E27FC236}">
+                <a16:creationId xmlns:a16="http://schemas.microsoft.com/office/drawing/2014/main" id="{7C460810-5A0F-4C91-89F9-7D27DB108EDF}"/>
+              </a:ext>
+            </a:extLst>
+          </p:cNvPr>
+          <p:cNvSpPr>
+            <a:spLocks noGrp="1"/>
+          </p:cNvSpPr>
+          <p:nvPr>
+            <p:ph type="sldNum" sz="quarter" idx="12"/>
+          </p:nvPr>
+        </p:nvSpPr>
+        <p:spPr/>
+        <p:txBody>
+          <a:bodyPr/>
+          <a:lstStyle/>
+          <a:p>
+            <a:fld id="{4854181D-6920-4594-9A5D-6CE56DC9F8B2}" type="slidenum">
+              <a:rPr lang="en-US" smtClean="0"/>
+              <a:t>14</a:t>
+            </a:fld>
+            <a:endParaRPr lang="en-US"/>
+          </a:p>
+        </p:txBody>
+      </p:sp>
     </p:spTree>
     <p:extLst>
       <p:ext uri="{BB962C8B-B14F-4D97-AF65-F5344CB8AC3E}">
@@ -5064,12 +5147,84 @@
           </a:p>
         </p:txBody>
       </p:sp>
+      <p:pic>
+        <p:nvPicPr>
+          <p:cNvPr id="6" name="Immagine 5" descr="Immagine che contiene screenshot&#10;&#10;Descrizione generata automaticamente">
+            <a:extLst>
+              <a:ext uri="{FF2B5EF4-FFF2-40B4-BE49-F238E27FC236}">
+                <a16:creationId xmlns:a16="http://schemas.microsoft.com/office/drawing/2014/main" id="{FD1407B5-1DA9-4C18-AF77-013E096F29B7}"/>
+              </a:ext>
+            </a:extLst>
+          </p:cNvPr>
+          <p:cNvPicPr>
+            <a:picLocks noChangeAspect="1"/>
+          </p:cNvPicPr>
+          <p:nvPr/>
+        </p:nvPicPr>
+        <p:blipFill>
+          <a:blip r:embed="rId3">
+            <a:extLst>
+              <a:ext uri="{28A0092B-C50C-407E-A947-70E740481C1C}">
+                <a14:useLocalDpi xmlns:a14="http://schemas.microsoft.com/office/drawing/2010/main" val="0"/>
+              </a:ext>
+            </a:extLst>
+          </a:blip>
+          <a:stretch>
+            <a:fillRect/>
+          </a:stretch>
+        </p:blipFill>
+        <p:spPr>
+          <a:xfrm>
+            <a:off x="602403" y="2792161"/>
+            <a:ext cx="5077716" cy="2045103"/>
+          </a:xfrm>
+          <a:prstGeom prst="rect">
+            <a:avLst/>
+          </a:prstGeom>
+        </p:spPr>
+      </p:pic>
+      <p:pic>
+        <p:nvPicPr>
+          <p:cNvPr id="8" name="Immagine 7">
+            <a:extLst>
+              <a:ext uri="{FF2B5EF4-FFF2-40B4-BE49-F238E27FC236}">
+                <a16:creationId xmlns:a16="http://schemas.microsoft.com/office/drawing/2014/main" id="{9339F9C3-419C-4808-99DB-106981BA3839}"/>
+              </a:ext>
+            </a:extLst>
+          </p:cNvPr>
+          <p:cNvPicPr>
+            <a:picLocks noChangeAspect="1"/>
+          </p:cNvPicPr>
+          <p:nvPr/>
+        </p:nvPicPr>
+        <p:blipFill>
+          <a:blip r:embed="rId4">
+            <a:extLst>
+              <a:ext uri="{28A0092B-C50C-407E-A947-70E740481C1C}">
+                <a14:useLocalDpi xmlns:a14="http://schemas.microsoft.com/office/drawing/2010/main" val="0"/>
+              </a:ext>
+            </a:extLst>
+          </a:blip>
+          <a:stretch>
+            <a:fillRect/>
+          </a:stretch>
+        </p:blipFill>
+        <p:spPr>
+          <a:xfrm>
+            <a:off x="6096000" y="1519997"/>
+            <a:ext cx="5493597" cy="4589429"/>
+          </a:xfrm>
+          <a:prstGeom prst="rect">
+            <a:avLst/>
+          </a:prstGeom>
+        </p:spPr>
+      </p:pic>
       <p:sp>
         <p:nvSpPr>
-          <p:cNvPr id="3" name="Segnaposto numero diapositiva 2">
+          <p:cNvPr id="2" name="Segnaposto numero diapositiva 1">
             <a:extLst>
               <a:ext uri="{FF2B5EF4-FFF2-40B4-BE49-F238E27FC236}">
-                <a16:creationId xmlns:a16="http://schemas.microsoft.com/office/drawing/2014/main" id="{9D4E6BFE-F9D6-4BAF-80BD-1D493B0A098A}"/>
+                <a16:creationId xmlns:a16="http://schemas.microsoft.com/office/drawing/2014/main" id="{C5BE8150-B75D-4DEF-A43A-0543361CA26C}"/>
               </a:ext>
             </a:extLst>
           </p:cNvPr>
@@ -5093,78 +5248,6 @@
           </a:p>
         </p:txBody>
       </p:sp>
-      <p:pic>
-        <p:nvPicPr>
-          <p:cNvPr id="6" name="Immagine 5" descr="Immagine che contiene screenshot&#10;&#10;Descrizione generata automaticamente">
-            <a:extLst>
-              <a:ext uri="{FF2B5EF4-FFF2-40B4-BE49-F238E27FC236}">
-                <a16:creationId xmlns:a16="http://schemas.microsoft.com/office/drawing/2014/main" id="{FD1407B5-1DA9-4C18-AF77-013E096F29B7}"/>
-              </a:ext>
-            </a:extLst>
-          </p:cNvPr>
-          <p:cNvPicPr>
-            <a:picLocks noChangeAspect="1"/>
-          </p:cNvPicPr>
-          <p:nvPr/>
-        </p:nvPicPr>
-        <p:blipFill>
-          <a:blip r:embed="rId3">
-            <a:extLst>
-              <a:ext uri="{28A0092B-C50C-407E-A947-70E740481C1C}">
-                <a14:useLocalDpi xmlns:a14="http://schemas.microsoft.com/office/drawing/2010/main" val="0"/>
-              </a:ext>
-            </a:extLst>
-          </a:blip>
-          <a:stretch>
-            <a:fillRect/>
-          </a:stretch>
-        </p:blipFill>
-        <p:spPr>
-          <a:xfrm>
-            <a:off x="337221" y="2792161"/>
-            <a:ext cx="5077716" cy="2045103"/>
-          </a:xfrm>
-          <a:prstGeom prst="rect">
-            <a:avLst/>
-          </a:prstGeom>
-        </p:spPr>
-      </p:pic>
-      <p:pic>
-        <p:nvPicPr>
-          <p:cNvPr id="8" name="Immagine 7">
-            <a:extLst>
-              <a:ext uri="{FF2B5EF4-FFF2-40B4-BE49-F238E27FC236}">
-                <a16:creationId xmlns:a16="http://schemas.microsoft.com/office/drawing/2014/main" id="{9339F9C3-419C-4808-99DB-106981BA3839}"/>
-              </a:ext>
-            </a:extLst>
-          </p:cNvPr>
-          <p:cNvPicPr>
-            <a:picLocks noChangeAspect="1"/>
-          </p:cNvPicPr>
-          <p:nvPr/>
-        </p:nvPicPr>
-        <p:blipFill>
-          <a:blip r:embed="rId4">
-            <a:extLst>
-              <a:ext uri="{28A0092B-C50C-407E-A947-70E740481C1C}">
-                <a14:useLocalDpi xmlns:a14="http://schemas.microsoft.com/office/drawing/2010/main" val="0"/>
-              </a:ext>
-            </a:extLst>
-          </a:blip>
-          <a:stretch>
-            <a:fillRect/>
-          </a:stretch>
-        </p:blipFill>
-        <p:spPr>
-          <a:xfrm>
-            <a:off x="5863801" y="1519998"/>
-            <a:ext cx="5493597" cy="4589429"/>
-          </a:xfrm>
-          <a:prstGeom prst="rect">
-            <a:avLst/>
-          </a:prstGeom>
-        </p:spPr>
-      </p:pic>
     </p:spTree>
     <p:extLst>
       <p:ext uri="{BB962C8B-B14F-4D97-AF65-F5344CB8AC3E}">
@@ -5281,35 +5364,6 @@
           </a:p>
         </p:txBody>
       </p:sp>
-      <p:sp>
-        <p:nvSpPr>
-          <p:cNvPr id="3" name="Segnaposto numero diapositiva 2">
-            <a:extLst>
-              <a:ext uri="{FF2B5EF4-FFF2-40B4-BE49-F238E27FC236}">
-                <a16:creationId xmlns:a16="http://schemas.microsoft.com/office/drawing/2014/main" id="{9D4E6BFE-F9D6-4BAF-80BD-1D493B0A098A}"/>
-              </a:ext>
-            </a:extLst>
-          </p:cNvPr>
-          <p:cNvSpPr>
-            <a:spLocks noGrp="1"/>
-          </p:cNvSpPr>
-          <p:nvPr>
-            <p:ph type="sldNum" sz="quarter" idx="12"/>
-          </p:nvPr>
-        </p:nvSpPr>
-        <p:spPr/>
-        <p:txBody>
-          <a:bodyPr/>
-          <a:lstStyle/>
-          <a:p>
-            <a:fld id="{4854181D-6920-4594-9A5D-6CE56DC9F8B2}" type="slidenum">
-              <a:rPr lang="en-US" smtClean="0"/>
-              <a:t>16</a:t>
-            </a:fld>
-            <a:endParaRPr lang="en-US"/>
-          </a:p>
-        </p:txBody>
-      </p:sp>
       <p:pic>
         <p:nvPicPr>
           <p:cNvPr id="5" name="Immagine 4" descr="Immagine che contiene screenshot&#10;&#10;Descrizione generata automaticamente">
@@ -5346,6 +5400,35 @@
           </a:prstGeom>
         </p:spPr>
       </p:pic>
+      <p:sp>
+        <p:nvSpPr>
+          <p:cNvPr id="2" name="Segnaposto numero diapositiva 1">
+            <a:extLst>
+              <a:ext uri="{FF2B5EF4-FFF2-40B4-BE49-F238E27FC236}">
+                <a16:creationId xmlns:a16="http://schemas.microsoft.com/office/drawing/2014/main" id="{A18B3BCB-DA3C-4EE6-ADC0-3FCB2CFEAD02}"/>
+              </a:ext>
+            </a:extLst>
+          </p:cNvPr>
+          <p:cNvSpPr>
+            <a:spLocks noGrp="1"/>
+          </p:cNvSpPr>
+          <p:nvPr>
+            <p:ph type="sldNum" sz="quarter" idx="12"/>
+          </p:nvPr>
+        </p:nvSpPr>
+        <p:spPr/>
+        <p:txBody>
+          <a:bodyPr/>
+          <a:lstStyle/>
+          <a:p>
+            <a:fld id="{4854181D-6920-4594-9A5D-6CE56DC9F8B2}" type="slidenum">
+              <a:rPr lang="en-US" smtClean="0"/>
+              <a:t>16</a:t>
+            </a:fld>
+            <a:endParaRPr lang="en-US"/>
+          </a:p>
+        </p:txBody>
+      </p:sp>
     </p:spTree>
     <p:extLst>
       <p:ext uri="{BB962C8B-B14F-4D97-AF65-F5344CB8AC3E}">
@@ -5871,10 +5954,10 @@
       </p:sp>
       <p:sp>
         <p:nvSpPr>
-          <p:cNvPr id="3" name="Segnaposto numero diapositiva 2">
+          <p:cNvPr id="2" name="Segnaposto numero diapositiva 1">
             <a:extLst>
               <a:ext uri="{FF2B5EF4-FFF2-40B4-BE49-F238E27FC236}">
-                <a16:creationId xmlns:a16="http://schemas.microsoft.com/office/drawing/2014/main" id="{9D4E6BFE-F9D6-4BAF-80BD-1D493B0A098A}"/>
+                <a16:creationId xmlns:a16="http://schemas.microsoft.com/office/drawing/2014/main" id="{8AFD7117-21B0-47EF-8110-9958517C0A96}"/>
               </a:ext>
             </a:extLst>
           </p:cNvPr>
@@ -6522,10 +6605,10 @@
       </p:sp>
       <p:sp>
         <p:nvSpPr>
-          <p:cNvPr id="3" name="Segnaposto numero diapositiva 2">
+          <p:cNvPr id="2" name="Segnaposto numero diapositiva 1">
             <a:extLst>
               <a:ext uri="{FF2B5EF4-FFF2-40B4-BE49-F238E27FC236}">
-                <a16:creationId xmlns:a16="http://schemas.microsoft.com/office/drawing/2014/main" id="{B7F1A0EE-8767-4CCF-B592-307DB0643630}"/>
+                <a16:creationId xmlns:a16="http://schemas.microsoft.com/office/drawing/2014/main" id="{D8F178AF-57A1-4604-BDC4-6998A478D968}"/>
               </a:ext>
             </a:extLst>
           </p:cNvPr>
@@ -7174,10 +7257,10 @@
       </p:sp>
       <p:sp>
         <p:nvSpPr>
-          <p:cNvPr id="3" name="Segnaposto numero diapositiva 2">
+          <p:cNvPr id="2" name="Segnaposto numero diapositiva 1">
             <a:extLst>
               <a:ext uri="{FF2B5EF4-FFF2-40B4-BE49-F238E27FC236}">
-                <a16:creationId xmlns:a16="http://schemas.microsoft.com/office/drawing/2014/main" id="{74471CCF-DD1C-42CD-9EA8-55DE505722AA}"/>
+                <a16:creationId xmlns:a16="http://schemas.microsoft.com/office/drawing/2014/main" id="{EA8FBF00-B0F0-4579-BC24-41F12891EFA5}"/>
               </a:ext>
             </a:extLst>
           </p:cNvPr>
@@ -7613,10 +7696,10 @@
       </p:sp>
       <p:sp>
         <p:nvSpPr>
-          <p:cNvPr id="3" name="Segnaposto numero diapositiva 2">
+          <p:cNvPr id="2" name="Segnaposto numero diapositiva 1">
             <a:extLst>
               <a:ext uri="{FF2B5EF4-FFF2-40B4-BE49-F238E27FC236}">
-                <a16:creationId xmlns:a16="http://schemas.microsoft.com/office/drawing/2014/main" id="{075B4F5A-2BB5-4E0E-9F24-054AA98CED71}"/>
+                <a16:creationId xmlns:a16="http://schemas.microsoft.com/office/drawing/2014/main" id="{FA8996B0-5ACC-4713-B7F7-02E5A056B3AB}"/>
               </a:ext>
             </a:extLst>
           </p:cNvPr>
@@ -8270,10 +8353,10 @@
       </p:sp>
       <p:sp>
         <p:nvSpPr>
-          <p:cNvPr id="3" name="Segnaposto numero diapositiva 2">
+          <p:cNvPr id="2" name="Segnaposto numero diapositiva 1">
             <a:extLst>
               <a:ext uri="{FF2B5EF4-FFF2-40B4-BE49-F238E27FC236}">
-                <a16:creationId xmlns:a16="http://schemas.microsoft.com/office/drawing/2014/main" id="{24B62806-4A7F-468D-9C6E-FA653B6FE253}"/>
+                <a16:creationId xmlns:a16="http://schemas.microsoft.com/office/drawing/2014/main" id="{5302166B-4BEB-4907-A716-F30AD269909F}"/>
               </a:ext>
             </a:extLst>
           </p:cNvPr>
@@ -8840,10 +8923,10 @@
       </p:sp>
       <p:sp>
         <p:nvSpPr>
-          <p:cNvPr id="6" name="Segnaposto numero diapositiva 5">
+          <p:cNvPr id="2" name="Segnaposto numero diapositiva 1">
             <a:extLst>
               <a:ext uri="{FF2B5EF4-FFF2-40B4-BE49-F238E27FC236}">
-                <a16:creationId xmlns:a16="http://schemas.microsoft.com/office/drawing/2014/main" id="{DCEEC4A1-07BB-49D0-9B46-E27BE2238F83}"/>
+                <a16:creationId xmlns:a16="http://schemas.microsoft.com/office/drawing/2014/main" id="{8DE1EB9E-19B3-4788-85CA-10E70389246C}"/>
               </a:ext>
             </a:extLst>
           </p:cNvPr>
@@ -9394,10 +9477,10 @@
       </p:sp>
       <p:sp>
         <p:nvSpPr>
-          <p:cNvPr id="5" name="Segnaposto numero diapositiva 4">
+          <p:cNvPr id="2" name="Segnaposto numero diapositiva 1">
             <a:extLst>
               <a:ext uri="{FF2B5EF4-FFF2-40B4-BE49-F238E27FC236}">
-                <a16:creationId xmlns:a16="http://schemas.microsoft.com/office/drawing/2014/main" id="{4F4507F0-A999-48B2-A69B-33ECA7540C34}"/>
+                <a16:creationId xmlns:a16="http://schemas.microsoft.com/office/drawing/2014/main" id="{DB9E6D09-CB4D-4000-B173-CE8E2992C063}"/>
               </a:ext>
             </a:extLst>
           </p:cNvPr>
@@ -10012,10 +10095,10 @@
       </p:sp>
       <p:sp>
         <p:nvSpPr>
-          <p:cNvPr id="5" name="Segnaposto numero diapositiva 4">
+          <p:cNvPr id="2" name="Segnaposto numero diapositiva 1">
             <a:extLst>
               <a:ext uri="{FF2B5EF4-FFF2-40B4-BE49-F238E27FC236}">
-                <a16:creationId xmlns:a16="http://schemas.microsoft.com/office/drawing/2014/main" id="{271F0076-91B2-4C67-9522-EDA2CF5A7883}"/>
+                <a16:creationId xmlns:a16="http://schemas.microsoft.com/office/drawing/2014/main" id="{2F26B40E-6425-473B-B061-FBB207CA5FC3}"/>
               </a:ext>
             </a:extLst>
           </p:cNvPr>
@@ -11051,10 +11134,10 @@
       </p:sp>
       <p:sp>
         <p:nvSpPr>
-          <p:cNvPr id="2" name="Segnaposto numero diapositiva 1">
+          <p:cNvPr id="3" name="Segnaposto numero diapositiva 2">
             <a:extLst>
               <a:ext uri="{FF2B5EF4-FFF2-40B4-BE49-F238E27FC236}">
-                <a16:creationId xmlns:a16="http://schemas.microsoft.com/office/drawing/2014/main" id="{C1895AC1-923F-461B-A013-48A3D35F6685}"/>
+                <a16:creationId xmlns:a16="http://schemas.microsoft.com/office/drawing/2014/main" id="{ECC89D23-2095-4787-85FD-29E68AF0DB5B}"/>
               </a:ext>
             </a:extLst>
           </p:cNvPr>
@@ -11194,35 +11277,6 @@
           </a:p>
         </p:txBody>
       </p:sp>
-      <p:sp>
-        <p:nvSpPr>
-          <p:cNvPr id="3" name="Segnaposto numero diapositiva 2">
-            <a:extLst>
-              <a:ext uri="{FF2B5EF4-FFF2-40B4-BE49-F238E27FC236}">
-                <a16:creationId xmlns:a16="http://schemas.microsoft.com/office/drawing/2014/main" id="{9D4E6BFE-F9D6-4BAF-80BD-1D493B0A098A}"/>
-              </a:ext>
-            </a:extLst>
-          </p:cNvPr>
-          <p:cNvSpPr>
-            <a:spLocks noGrp="1"/>
-          </p:cNvSpPr>
-          <p:nvPr>
-            <p:ph type="sldNum" sz="quarter" idx="12"/>
-          </p:nvPr>
-        </p:nvSpPr>
-        <p:spPr/>
-        <p:txBody>
-          <a:bodyPr/>
-          <a:lstStyle/>
-          <a:p>
-            <a:fld id="{4854181D-6920-4594-9A5D-6CE56DC9F8B2}" type="slidenum">
-              <a:rPr lang="en-US" smtClean="0"/>
-              <a:t>25</a:t>
-            </a:fld>
-            <a:endParaRPr lang="en-US"/>
-          </a:p>
-        </p:txBody>
-      </p:sp>
       <p:pic>
         <p:nvPicPr>
           <p:cNvPr id="20" name="Immagine 19">
@@ -11253,6 +11307,35 @@
           </a:prstGeom>
         </p:spPr>
       </p:pic>
+      <p:sp>
+        <p:nvSpPr>
+          <p:cNvPr id="2" name="Segnaposto numero diapositiva 1">
+            <a:extLst>
+              <a:ext uri="{FF2B5EF4-FFF2-40B4-BE49-F238E27FC236}">
+                <a16:creationId xmlns:a16="http://schemas.microsoft.com/office/drawing/2014/main" id="{350C013C-7F40-436F-BE3C-683F9EC1CA4F}"/>
+              </a:ext>
+            </a:extLst>
+          </p:cNvPr>
+          <p:cNvSpPr>
+            <a:spLocks noGrp="1"/>
+          </p:cNvSpPr>
+          <p:nvPr>
+            <p:ph type="sldNum" sz="quarter" idx="12"/>
+          </p:nvPr>
+        </p:nvSpPr>
+        <p:spPr/>
+        <p:txBody>
+          <a:bodyPr/>
+          <a:lstStyle/>
+          <a:p>
+            <a:fld id="{4854181D-6920-4594-9A5D-6CE56DC9F8B2}" type="slidenum">
+              <a:rPr lang="en-US" smtClean="0"/>
+              <a:t>25</a:t>
+            </a:fld>
+            <a:endParaRPr lang="en-US"/>
+          </a:p>
+        </p:txBody>
+      </p:sp>
     </p:spTree>
     <p:extLst>
       <p:ext uri="{BB962C8B-B14F-4D97-AF65-F5344CB8AC3E}">
@@ -11369,35 +11452,6 @@
           </a:p>
         </p:txBody>
       </p:sp>
-      <p:sp>
-        <p:nvSpPr>
-          <p:cNvPr id="3" name="Segnaposto numero diapositiva 2">
-            <a:extLst>
-              <a:ext uri="{FF2B5EF4-FFF2-40B4-BE49-F238E27FC236}">
-                <a16:creationId xmlns:a16="http://schemas.microsoft.com/office/drawing/2014/main" id="{9D4E6BFE-F9D6-4BAF-80BD-1D493B0A098A}"/>
-              </a:ext>
-            </a:extLst>
-          </p:cNvPr>
-          <p:cNvSpPr>
-            <a:spLocks noGrp="1"/>
-          </p:cNvSpPr>
-          <p:nvPr>
-            <p:ph type="sldNum" sz="quarter" idx="12"/>
-          </p:nvPr>
-        </p:nvSpPr>
-        <p:spPr/>
-        <p:txBody>
-          <a:bodyPr/>
-          <a:lstStyle/>
-          <a:p>
-            <a:fld id="{4854181D-6920-4594-9A5D-6CE56DC9F8B2}" type="slidenum">
-              <a:rPr lang="en-US" smtClean="0"/>
-              <a:t>26</a:t>
-            </a:fld>
-            <a:endParaRPr lang="en-US"/>
-          </a:p>
-        </p:txBody>
-      </p:sp>
       <p:pic>
         <p:nvPicPr>
           <p:cNvPr id="5" name="Immagine 4">
@@ -11428,6 +11482,35 @@
           </a:prstGeom>
         </p:spPr>
       </p:pic>
+      <p:sp>
+        <p:nvSpPr>
+          <p:cNvPr id="2" name="Segnaposto numero diapositiva 1">
+            <a:extLst>
+              <a:ext uri="{FF2B5EF4-FFF2-40B4-BE49-F238E27FC236}">
+                <a16:creationId xmlns:a16="http://schemas.microsoft.com/office/drawing/2014/main" id="{B0EA013E-5233-4A5E-851F-E472DBD666FE}"/>
+              </a:ext>
+            </a:extLst>
+          </p:cNvPr>
+          <p:cNvSpPr>
+            <a:spLocks noGrp="1"/>
+          </p:cNvSpPr>
+          <p:nvPr>
+            <p:ph type="sldNum" sz="quarter" idx="12"/>
+          </p:nvPr>
+        </p:nvSpPr>
+        <p:spPr/>
+        <p:txBody>
+          <a:bodyPr/>
+          <a:lstStyle/>
+          <a:p>
+            <a:fld id="{4854181D-6920-4594-9A5D-6CE56DC9F8B2}" type="slidenum">
+              <a:rPr lang="en-US" smtClean="0"/>
+              <a:t>26</a:t>
+            </a:fld>
+            <a:endParaRPr lang="en-US"/>
+          </a:p>
+        </p:txBody>
+      </p:sp>
     </p:spTree>
     <p:extLst>
       <p:ext uri="{BB962C8B-B14F-4D97-AF65-F5344CB8AC3E}">
@@ -11544,35 +11627,6 @@
           </a:p>
         </p:txBody>
       </p:sp>
-      <p:sp>
-        <p:nvSpPr>
-          <p:cNvPr id="3" name="Segnaposto numero diapositiva 2">
-            <a:extLst>
-              <a:ext uri="{FF2B5EF4-FFF2-40B4-BE49-F238E27FC236}">
-                <a16:creationId xmlns:a16="http://schemas.microsoft.com/office/drawing/2014/main" id="{9D4E6BFE-F9D6-4BAF-80BD-1D493B0A098A}"/>
-              </a:ext>
-            </a:extLst>
-          </p:cNvPr>
-          <p:cNvSpPr>
-            <a:spLocks noGrp="1"/>
-          </p:cNvSpPr>
-          <p:nvPr>
-            <p:ph type="sldNum" sz="quarter" idx="12"/>
-          </p:nvPr>
-        </p:nvSpPr>
-        <p:spPr/>
-        <p:txBody>
-          <a:bodyPr/>
-          <a:lstStyle/>
-          <a:p>
-            <a:fld id="{4854181D-6920-4594-9A5D-6CE56DC9F8B2}" type="slidenum">
-              <a:rPr lang="en-US" smtClean="0"/>
-              <a:t>27</a:t>
-            </a:fld>
-            <a:endParaRPr lang="en-US"/>
-          </a:p>
-        </p:txBody>
-      </p:sp>
       <p:pic>
         <p:nvPicPr>
           <p:cNvPr id="7" name="Immagine 6">
@@ -11707,6 +11761,35 @@
               </a:rPr>
               <a:t>Blu: posizione stimata</a:t>
             </a:r>
+          </a:p>
+        </p:txBody>
+      </p:sp>
+      <p:sp>
+        <p:nvSpPr>
+          <p:cNvPr id="2" name="Segnaposto numero diapositiva 1">
+            <a:extLst>
+              <a:ext uri="{FF2B5EF4-FFF2-40B4-BE49-F238E27FC236}">
+                <a16:creationId xmlns:a16="http://schemas.microsoft.com/office/drawing/2014/main" id="{59F8649F-0D0A-4789-99B2-80D806AD821D}"/>
+              </a:ext>
+            </a:extLst>
+          </p:cNvPr>
+          <p:cNvSpPr>
+            <a:spLocks noGrp="1"/>
+          </p:cNvSpPr>
+          <p:nvPr>
+            <p:ph type="sldNum" sz="quarter" idx="12"/>
+          </p:nvPr>
+        </p:nvSpPr>
+        <p:spPr/>
+        <p:txBody>
+          <a:bodyPr/>
+          <a:lstStyle/>
+          <a:p>
+            <a:fld id="{4854181D-6920-4594-9A5D-6CE56DC9F8B2}" type="slidenum">
+              <a:rPr lang="en-US" smtClean="0"/>
+              <a:t>27</a:t>
+            </a:fld>
+            <a:endParaRPr lang="en-US"/>
           </a:p>
         </p:txBody>
       </p:sp>
@@ -11826,35 +11909,6 @@
           </a:p>
         </p:txBody>
       </p:sp>
-      <p:sp>
-        <p:nvSpPr>
-          <p:cNvPr id="3" name="Segnaposto numero diapositiva 2">
-            <a:extLst>
-              <a:ext uri="{FF2B5EF4-FFF2-40B4-BE49-F238E27FC236}">
-                <a16:creationId xmlns:a16="http://schemas.microsoft.com/office/drawing/2014/main" id="{9D4E6BFE-F9D6-4BAF-80BD-1D493B0A098A}"/>
-              </a:ext>
-            </a:extLst>
-          </p:cNvPr>
-          <p:cNvSpPr>
-            <a:spLocks noGrp="1"/>
-          </p:cNvSpPr>
-          <p:nvPr>
-            <p:ph type="sldNum" sz="quarter" idx="12"/>
-          </p:nvPr>
-        </p:nvSpPr>
-        <p:spPr/>
-        <p:txBody>
-          <a:bodyPr/>
-          <a:lstStyle/>
-          <a:p>
-            <a:fld id="{4854181D-6920-4594-9A5D-6CE56DC9F8B2}" type="slidenum">
-              <a:rPr lang="en-US" smtClean="0"/>
-              <a:t>28</a:t>
-            </a:fld>
-            <a:endParaRPr lang="en-US"/>
-          </a:p>
-        </p:txBody>
-      </p:sp>
       <p:pic>
         <p:nvPicPr>
           <p:cNvPr id="5" name="Immagine 4">
@@ -11885,6 +11939,35 @@
           </a:prstGeom>
         </p:spPr>
       </p:pic>
+      <p:sp>
+        <p:nvSpPr>
+          <p:cNvPr id="2" name="Segnaposto numero diapositiva 1">
+            <a:extLst>
+              <a:ext uri="{FF2B5EF4-FFF2-40B4-BE49-F238E27FC236}">
+                <a16:creationId xmlns:a16="http://schemas.microsoft.com/office/drawing/2014/main" id="{2D93E094-05D2-4BA6-88B6-09B7A104FE2E}"/>
+              </a:ext>
+            </a:extLst>
+          </p:cNvPr>
+          <p:cNvSpPr>
+            <a:spLocks noGrp="1"/>
+          </p:cNvSpPr>
+          <p:nvPr>
+            <p:ph type="sldNum" sz="quarter" idx="12"/>
+          </p:nvPr>
+        </p:nvSpPr>
+        <p:spPr/>
+        <p:txBody>
+          <a:bodyPr/>
+          <a:lstStyle/>
+          <a:p>
+            <a:fld id="{4854181D-6920-4594-9A5D-6CE56DC9F8B2}" type="slidenum">
+              <a:rPr lang="en-US" smtClean="0"/>
+              <a:t>28</a:t>
+            </a:fld>
+            <a:endParaRPr lang="en-US"/>
+          </a:p>
+        </p:txBody>
+      </p:sp>
     </p:spTree>
     <p:extLst>
       <p:ext uri="{BB962C8B-B14F-4D97-AF65-F5344CB8AC3E}">
@@ -11958,7 +12041,7 @@
           <a:lstStyle/>
           <a:p>
             <a:r>
-              <a:rPr lang="it-IT" sz="4000" b="1" dirty="0">
+              <a:rPr lang="it-IT" sz="4000" b="1">
                 <a:solidFill>
                   <a:schemeClr val="bg1"/>
                 </a:solidFill>
@@ -11967,7 +12050,7 @@
             </a:r>
           </a:p>
           <a:p>
-            <a:endParaRPr lang="it-IT" sz="4000" u="sng" dirty="0">
+            <a:endParaRPr lang="it-IT" sz="4000" u="sng">
               <a:solidFill>
                 <a:schemeClr val="bg1"/>
               </a:solidFill>
@@ -12040,7 +12123,7 @@
               <a:buChar char="•"/>
             </a:pPr>
             <a:r>
-              <a:rPr lang="it-IT" sz="2400" dirty="0">
+              <a:rPr lang="it-IT" sz="2400">
                 <a:solidFill>
                   <a:schemeClr val="bg1"/>
                 </a:solidFill>
@@ -12048,7 +12131,7 @@
               <a:t>Input: </a:t>
             </a:r>
             <a:r>
-              <a:rPr lang="it-IT" sz="2400" b="1" dirty="0">
+              <a:rPr lang="it-IT" sz="2400" b="1">
                 <a:solidFill>
                   <a:schemeClr val="bg1"/>
                 </a:solidFill>
@@ -12056,44 +12139,12 @@
               <a:t>n</a:t>
             </a:r>
             <a:r>
-              <a:rPr lang="it-IT" sz="2400" dirty="0">
+              <a:rPr lang="it-IT" sz="2400">
                 <a:solidFill>
                   <a:schemeClr val="bg1"/>
                 </a:solidFill>
               </a:rPr>
-              <a:t> vettore 7x1 delle velocità desiderate delle eliche dei </a:t>
-            </a:r>
-            <a:r>
-              <a:rPr lang="it-IT" sz="2400" dirty="0" err="1">
-                <a:solidFill>
-                  <a:schemeClr val="bg1"/>
-                </a:solidFill>
-              </a:rPr>
-              <a:t>thruster</a:t>
-            </a:r>
-            <a:r>
-              <a:rPr lang="it-IT" sz="2400" dirty="0">
-                <a:solidFill>
-                  <a:schemeClr val="bg1"/>
-                </a:solidFill>
-              </a:rPr>
-              <a:t> (</a:t>
-            </a:r>
-            <a:r>
-              <a:rPr lang="it-IT" sz="2400" dirty="0" err="1">
-                <a:solidFill>
-                  <a:schemeClr val="bg1"/>
-                </a:solidFill>
-              </a:rPr>
-              <a:t>rad</a:t>
-            </a:r>
-            <a:r>
-              <a:rPr lang="it-IT" sz="2400" dirty="0">
-                <a:solidFill>
-                  <a:schemeClr val="bg1"/>
-                </a:solidFill>
-              </a:rPr>
-              <a:t>/s) </a:t>
+              <a:t> vettore 7x1 delle velocità desiderate delle eliche dei thruster (rad/s) </a:t>
             </a:r>
           </a:p>
           <a:p>
@@ -12101,7 +12152,7 @@
               <a:buFont typeface="Arial" panose="020B0604020202020204" pitchFamily="34" charset="0"/>
               <a:buChar char="•"/>
             </a:pPr>
-            <a:endParaRPr lang="it-IT" sz="2400" dirty="0">
+            <a:endParaRPr lang="it-IT" sz="2400">
               <a:solidFill>
                 <a:schemeClr val="bg1"/>
               </a:solidFill>
@@ -12113,7 +12164,7 @@
               <a:buChar char="•"/>
             </a:pPr>
             <a:r>
-              <a:rPr lang="it-IT" sz="2400" dirty="0">
+              <a:rPr lang="it-IT" sz="2400">
                 <a:solidFill>
                   <a:schemeClr val="bg1"/>
                 </a:solidFill>
@@ -12126,12 +12177,48 @@
           </a:p>
         </p:txBody>
       </p:sp>
+      <p:pic>
+        <p:nvPicPr>
+          <p:cNvPr id="5" name="Immagine 4">
+            <a:extLst>
+              <a:ext uri="{FF2B5EF4-FFF2-40B4-BE49-F238E27FC236}">
+                <a16:creationId xmlns:a16="http://schemas.microsoft.com/office/drawing/2014/main" id="{F96452AE-B346-4DA4-B49D-FF8873DFFFC3}"/>
+              </a:ext>
+            </a:extLst>
+          </p:cNvPr>
+          <p:cNvPicPr>
+            <a:picLocks noChangeAspect="1"/>
+          </p:cNvPicPr>
+          <p:nvPr/>
+        </p:nvPicPr>
+        <p:blipFill>
+          <a:blip r:embed="rId3">
+            <a:extLst>
+              <a:ext uri="{28A0092B-C50C-407E-A947-70E740481C1C}">
+                <a14:useLocalDpi xmlns:a14="http://schemas.microsoft.com/office/drawing/2010/main" val="0"/>
+              </a:ext>
+            </a:extLst>
+          </a:blip>
+          <a:stretch>
+            <a:fillRect/>
+          </a:stretch>
+        </p:blipFill>
+        <p:spPr>
+          <a:xfrm>
+            <a:off x="6800295" y="631856"/>
+            <a:ext cx="4631979" cy="5582348"/>
+          </a:xfrm>
+          <a:prstGeom prst="rect">
+            <a:avLst/>
+          </a:prstGeom>
+        </p:spPr>
+      </p:pic>
       <p:sp>
         <p:nvSpPr>
-          <p:cNvPr id="3" name="Segnaposto numero diapositiva 2">
+          <p:cNvPr id="7" name="Segnaposto numero diapositiva 6">
             <a:extLst>
               <a:ext uri="{FF2B5EF4-FFF2-40B4-BE49-F238E27FC236}">
-                <a16:creationId xmlns:a16="http://schemas.microsoft.com/office/drawing/2014/main" id="{E90B0F11-69C7-434D-897F-49F172DD8589}"/>
+                <a16:creationId xmlns:a16="http://schemas.microsoft.com/office/drawing/2014/main" id="{7E1C3A03-FDB3-4D09-AE97-4F7C1F4DCA03}"/>
               </a:ext>
             </a:extLst>
           </p:cNvPr>
@@ -12155,35 +12242,6 @@
           </a:p>
         </p:txBody>
       </p:sp>
-      <p:pic>
-        <p:nvPicPr>
-          <p:cNvPr id="2" name="Immagine 1">
-            <a:extLst>
-              <a:ext uri="{FF2B5EF4-FFF2-40B4-BE49-F238E27FC236}">
-                <a16:creationId xmlns:a16="http://schemas.microsoft.com/office/drawing/2014/main" id="{E03C55DB-D57C-41DD-879A-B5D6B714B35E}"/>
-              </a:ext>
-            </a:extLst>
-          </p:cNvPr>
-          <p:cNvPicPr>
-            <a:picLocks noChangeAspect="1"/>
-          </p:cNvPicPr>
-          <p:nvPr/>
-        </p:nvPicPr>
-        <p:blipFill rotWithShape="1">
-          <a:blip r:embed="rId3"/>
-          <a:srcRect l="43221" t="32578" r="29566" b="9455"/>
-          <a:stretch/>
-        </p:blipFill>
-        <p:spPr>
-          <a:xfrm>
-            <a:off x="6975835" y="750851"/>
-            <a:ext cx="4487159" cy="5376572"/>
-          </a:xfrm>
-          <a:prstGeom prst="rect">
-            <a:avLst/>
-          </a:prstGeom>
-        </p:spPr>
-      </p:pic>
     </p:spTree>
     <p:extLst>
       <p:ext uri="{BB962C8B-B14F-4D97-AF65-F5344CB8AC3E}">
@@ -12536,7 +12594,7 @@
         <p:spPr>
           <a:xfrm>
             <a:off x="4784006" y="4461550"/>
-            <a:ext cx="4690857" cy="2308324"/>
+            <a:ext cx="4690857" cy="2031325"/>
           </a:xfrm>
           <a:prstGeom prst="rect">
             <a:avLst/>
@@ -12555,17 +12613,7 @@
                   <a:schemeClr val="bg1"/>
                 </a:solidFill>
               </a:rPr>
-              <a:t>a = b = 0.35m</a:t>
-            </a:r>
-          </a:p>
-          <a:p>
-            <a:r>
-              <a:rPr lang="it-IT" dirty="0">
-                <a:solidFill>
-                  <a:schemeClr val="bg1"/>
-                </a:solidFill>
-              </a:rPr>
-              <a:t>c = 0.19m</a:t>
+              <a:t>a = b = 0.35m	c = 0.19m</a:t>
             </a:r>
           </a:p>
           <a:p>
@@ -12601,7 +12649,7 @@
                   <a:schemeClr val="bg1"/>
                 </a:solidFill>
               </a:rPr>
-              <a:t>3</a:t>
+              <a:t>3 </a:t>
             </a:r>
           </a:p>
           <a:p>
@@ -12861,10 +12909,10 @@
       </p:sp>
       <p:sp>
         <p:nvSpPr>
-          <p:cNvPr id="3" name="Segnaposto numero diapositiva 2">
+          <p:cNvPr id="2" name="Segnaposto numero diapositiva 1">
             <a:extLst>
               <a:ext uri="{FF2B5EF4-FFF2-40B4-BE49-F238E27FC236}">
-                <a16:creationId xmlns:a16="http://schemas.microsoft.com/office/drawing/2014/main" id="{B6CFE4A3-20B8-4B02-B01E-127C2499CDCF}"/>
+                <a16:creationId xmlns:a16="http://schemas.microsoft.com/office/drawing/2014/main" id="{A0BDB7C5-88D6-48C7-90EA-2A37C90871EA}"/>
               </a:ext>
             </a:extLst>
           </p:cNvPr>
@@ -12884,7 +12932,7 @@
               <a:rPr lang="en-US" smtClean="0"/>
               <a:t>4</a:t>
             </a:fld>
-            <a:endParaRPr lang="en-US" dirty="0"/>
+            <a:endParaRPr lang="en-US"/>
           </a:p>
         </p:txBody>
       </p:sp>
@@ -13369,10 +13417,10 @@
       </p:pic>
       <p:sp>
         <p:nvSpPr>
-          <p:cNvPr id="5" name="Segnaposto numero diapositiva 4">
+          <p:cNvPr id="2" name="Segnaposto numero diapositiva 1">
             <a:extLst>
               <a:ext uri="{FF2B5EF4-FFF2-40B4-BE49-F238E27FC236}">
-                <a16:creationId xmlns:a16="http://schemas.microsoft.com/office/drawing/2014/main" id="{E23E9305-97DD-4758-B45C-AEDCFD519473}"/>
+                <a16:creationId xmlns:a16="http://schemas.microsoft.com/office/drawing/2014/main" id="{C227B643-F35F-46B0-940B-C5625CFF96D5}"/>
               </a:ext>
             </a:extLst>
           </p:cNvPr>
@@ -13396,6 +13444,324 @@
           </a:p>
         </p:txBody>
       </p:sp>
+      <p:cxnSp>
+        <p:nvCxnSpPr>
+          <p:cNvPr id="7" name="Connettore 2 6">
+            <a:extLst>
+              <a:ext uri="{FF2B5EF4-FFF2-40B4-BE49-F238E27FC236}">
+                <a16:creationId xmlns:a16="http://schemas.microsoft.com/office/drawing/2014/main" id="{311EBE68-FD1A-4F4C-B379-09EC9C9DDFA1}"/>
+              </a:ext>
+            </a:extLst>
+          </p:cNvPr>
+          <p:cNvCxnSpPr>
+            <a:cxnSpLocks/>
+          </p:cNvCxnSpPr>
+          <p:nvPr/>
+        </p:nvCxnSpPr>
+        <p:spPr>
+          <a:xfrm>
+            <a:off x="8663866" y="2192784"/>
+            <a:ext cx="0" cy="363985"/>
+          </a:xfrm>
+          <a:prstGeom prst="straightConnector1">
+            <a:avLst/>
+          </a:prstGeom>
+          <a:ln w="57150">
+            <a:solidFill>
+              <a:schemeClr val="accent6">
+                <a:lumMod val="50000"/>
+              </a:schemeClr>
+            </a:solidFill>
+            <a:tailEnd type="triangle"/>
+          </a:ln>
+        </p:spPr>
+        <p:style>
+          <a:lnRef idx="1">
+            <a:schemeClr val="accent1"/>
+          </a:lnRef>
+          <a:fillRef idx="0">
+            <a:schemeClr val="accent1"/>
+          </a:fillRef>
+          <a:effectRef idx="0">
+            <a:schemeClr val="accent1"/>
+          </a:effectRef>
+          <a:fontRef idx="minor">
+            <a:schemeClr val="tx1"/>
+          </a:fontRef>
+        </p:style>
+      </p:cxnSp>
+      <p:cxnSp>
+        <p:nvCxnSpPr>
+          <p:cNvPr id="9" name="Connettore 2 8">
+            <a:extLst>
+              <a:ext uri="{FF2B5EF4-FFF2-40B4-BE49-F238E27FC236}">
+                <a16:creationId xmlns:a16="http://schemas.microsoft.com/office/drawing/2014/main" id="{B94B36EB-3B86-4B9A-B8DB-0C302587CF06}"/>
+              </a:ext>
+            </a:extLst>
+          </p:cNvPr>
+          <p:cNvCxnSpPr>
+            <a:cxnSpLocks/>
+          </p:cNvCxnSpPr>
+          <p:nvPr/>
+        </p:nvCxnSpPr>
+        <p:spPr>
+          <a:xfrm>
+            <a:off x="8142303" y="2667739"/>
+            <a:ext cx="0" cy="363985"/>
+          </a:xfrm>
+          <a:prstGeom prst="straightConnector1">
+            <a:avLst/>
+          </a:prstGeom>
+          <a:ln w="57150">
+            <a:solidFill>
+              <a:schemeClr val="accent6">
+                <a:lumMod val="50000"/>
+              </a:schemeClr>
+            </a:solidFill>
+            <a:tailEnd type="triangle"/>
+          </a:ln>
+        </p:spPr>
+        <p:style>
+          <a:lnRef idx="1">
+            <a:schemeClr val="accent1"/>
+          </a:lnRef>
+          <a:fillRef idx="0">
+            <a:schemeClr val="accent1"/>
+          </a:fillRef>
+          <a:effectRef idx="0">
+            <a:schemeClr val="accent1"/>
+          </a:effectRef>
+          <a:fontRef idx="minor">
+            <a:schemeClr val="tx1"/>
+          </a:fontRef>
+        </p:style>
+      </p:cxnSp>
+      <p:cxnSp>
+        <p:nvCxnSpPr>
+          <p:cNvPr id="10" name="Connettore 2 9">
+            <a:extLst>
+              <a:ext uri="{FF2B5EF4-FFF2-40B4-BE49-F238E27FC236}">
+                <a16:creationId xmlns:a16="http://schemas.microsoft.com/office/drawing/2014/main" id="{8DF8120A-8582-4849-B6CE-7EF14F95A154}"/>
+              </a:ext>
+            </a:extLst>
+          </p:cNvPr>
+          <p:cNvCxnSpPr>
+            <a:cxnSpLocks/>
+          </p:cNvCxnSpPr>
+          <p:nvPr/>
+        </p:nvCxnSpPr>
+        <p:spPr>
+          <a:xfrm>
+            <a:off x="8967186" y="3031724"/>
+            <a:ext cx="0" cy="363985"/>
+          </a:xfrm>
+          <a:prstGeom prst="straightConnector1">
+            <a:avLst/>
+          </a:prstGeom>
+          <a:ln w="57150">
+            <a:solidFill>
+              <a:schemeClr val="accent6">
+                <a:lumMod val="50000"/>
+              </a:schemeClr>
+            </a:solidFill>
+            <a:tailEnd type="triangle"/>
+          </a:ln>
+        </p:spPr>
+        <p:style>
+          <a:lnRef idx="1">
+            <a:schemeClr val="accent1"/>
+          </a:lnRef>
+          <a:fillRef idx="0">
+            <a:schemeClr val="accent1"/>
+          </a:fillRef>
+          <a:effectRef idx="0">
+            <a:schemeClr val="accent1"/>
+          </a:effectRef>
+          <a:fontRef idx="minor">
+            <a:schemeClr val="tx1"/>
+          </a:fontRef>
+        </p:style>
+      </p:cxnSp>
+      <p:cxnSp>
+        <p:nvCxnSpPr>
+          <p:cNvPr id="13" name="Connettore 2 12">
+            <a:extLst>
+              <a:ext uri="{FF2B5EF4-FFF2-40B4-BE49-F238E27FC236}">
+                <a16:creationId xmlns:a16="http://schemas.microsoft.com/office/drawing/2014/main" id="{B827912F-F5C8-439C-B6F2-986C445C948D}"/>
+              </a:ext>
+            </a:extLst>
+          </p:cNvPr>
+          <p:cNvCxnSpPr>
+            <a:cxnSpLocks/>
+          </p:cNvCxnSpPr>
+          <p:nvPr/>
+        </p:nvCxnSpPr>
+        <p:spPr>
+          <a:xfrm>
+            <a:off x="7528264" y="3395709"/>
+            <a:ext cx="295923" cy="294443"/>
+          </a:xfrm>
+          <a:prstGeom prst="straightConnector1">
+            <a:avLst/>
+          </a:prstGeom>
+          <a:ln w="57150">
+            <a:solidFill>
+              <a:schemeClr val="accent1">
+                <a:lumMod val="50000"/>
+              </a:schemeClr>
+            </a:solidFill>
+            <a:tailEnd type="triangle"/>
+          </a:ln>
+        </p:spPr>
+        <p:style>
+          <a:lnRef idx="1">
+            <a:schemeClr val="accent1"/>
+          </a:lnRef>
+          <a:fillRef idx="0">
+            <a:schemeClr val="accent1"/>
+          </a:fillRef>
+          <a:effectRef idx="0">
+            <a:schemeClr val="accent1"/>
+          </a:effectRef>
+          <a:fontRef idx="minor">
+            <a:schemeClr val="tx1"/>
+          </a:fontRef>
+        </p:style>
+      </p:cxnSp>
+      <p:cxnSp>
+        <p:nvCxnSpPr>
+          <p:cNvPr id="17" name="Connettore 2 16">
+            <a:extLst>
+              <a:ext uri="{FF2B5EF4-FFF2-40B4-BE49-F238E27FC236}">
+                <a16:creationId xmlns:a16="http://schemas.microsoft.com/office/drawing/2014/main" id="{853452A8-0811-4A9F-8098-E914587F29E1}"/>
+              </a:ext>
+            </a:extLst>
+          </p:cNvPr>
+          <p:cNvCxnSpPr>
+            <a:cxnSpLocks/>
+          </p:cNvCxnSpPr>
+          <p:nvPr/>
+        </p:nvCxnSpPr>
+        <p:spPr>
+          <a:xfrm>
+            <a:off x="9698075" y="2129159"/>
+            <a:ext cx="315937" cy="223424"/>
+          </a:xfrm>
+          <a:prstGeom prst="straightConnector1">
+            <a:avLst/>
+          </a:prstGeom>
+          <a:ln w="57150">
+            <a:solidFill>
+              <a:schemeClr val="accent1">
+                <a:lumMod val="50000"/>
+              </a:schemeClr>
+            </a:solidFill>
+            <a:tailEnd type="triangle"/>
+          </a:ln>
+        </p:spPr>
+        <p:style>
+          <a:lnRef idx="1">
+            <a:schemeClr val="accent1"/>
+          </a:lnRef>
+          <a:fillRef idx="0">
+            <a:schemeClr val="accent1"/>
+          </a:fillRef>
+          <a:effectRef idx="0">
+            <a:schemeClr val="accent1"/>
+          </a:effectRef>
+          <a:fontRef idx="minor">
+            <a:schemeClr val="tx1"/>
+          </a:fontRef>
+        </p:style>
+      </p:cxnSp>
+      <p:cxnSp>
+        <p:nvCxnSpPr>
+          <p:cNvPr id="21" name="Connettore 2 20">
+            <a:extLst>
+              <a:ext uri="{FF2B5EF4-FFF2-40B4-BE49-F238E27FC236}">
+                <a16:creationId xmlns:a16="http://schemas.microsoft.com/office/drawing/2014/main" id="{D1119856-D452-476B-A760-999351FC0FA0}"/>
+              </a:ext>
+            </a:extLst>
+          </p:cNvPr>
+          <p:cNvCxnSpPr>
+            <a:cxnSpLocks/>
+          </p:cNvCxnSpPr>
+          <p:nvPr/>
+        </p:nvCxnSpPr>
+        <p:spPr>
+          <a:xfrm flipV="1">
+            <a:off x="9486450" y="3615634"/>
+            <a:ext cx="423249" cy="248575"/>
+          </a:xfrm>
+          <a:prstGeom prst="straightConnector1">
+            <a:avLst/>
+          </a:prstGeom>
+          <a:ln w="57150">
+            <a:solidFill>
+              <a:srgbClr val="0F6C00"/>
+            </a:solidFill>
+            <a:tailEnd type="triangle"/>
+          </a:ln>
+        </p:spPr>
+        <p:style>
+          <a:lnRef idx="1">
+            <a:schemeClr val="accent1"/>
+          </a:lnRef>
+          <a:fillRef idx="0">
+            <a:schemeClr val="accent1"/>
+          </a:fillRef>
+          <a:effectRef idx="0">
+            <a:schemeClr val="accent1"/>
+          </a:effectRef>
+          <a:fontRef idx="minor">
+            <a:schemeClr val="tx1"/>
+          </a:fontRef>
+        </p:style>
+      </p:cxnSp>
+      <p:cxnSp>
+        <p:nvCxnSpPr>
+          <p:cNvPr id="29" name="Connettore 2 28">
+            <a:extLst>
+              <a:ext uri="{FF2B5EF4-FFF2-40B4-BE49-F238E27FC236}">
+                <a16:creationId xmlns:a16="http://schemas.microsoft.com/office/drawing/2014/main" id="{A4AA1264-0309-4726-8574-7CF006DEDD89}"/>
+              </a:ext>
+            </a:extLst>
+          </p:cNvPr>
+          <p:cNvCxnSpPr>
+            <a:cxnSpLocks/>
+          </p:cNvCxnSpPr>
+          <p:nvPr/>
+        </p:nvCxnSpPr>
+        <p:spPr>
+          <a:xfrm flipH="1">
+            <a:off x="7824188" y="1997476"/>
+            <a:ext cx="369901" cy="191936"/>
+          </a:xfrm>
+          <a:prstGeom prst="straightConnector1">
+            <a:avLst/>
+          </a:prstGeom>
+          <a:ln w="57150">
+            <a:solidFill>
+              <a:srgbClr val="0F6C00"/>
+            </a:solidFill>
+            <a:tailEnd type="triangle"/>
+          </a:ln>
+        </p:spPr>
+        <p:style>
+          <a:lnRef idx="1">
+            <a:schemeClr val="accent1"/>
+          </a:lnRef>
+          <a:fillRef idx="0">
+            <a:schemeClr val="accent1"/>
+          </a:fillRef>
+          <a:effectRef idx="0">
+            <a:schemeClr val="accent1"/>
+          </a:effectRef>
+          <a:fontRef idx="minor">
+            <a:schemeClr val="tx1"/>
+          </a:fontRef>
+        </p:style>
+      </p:cxnSp>
     </p:spTree>
     <p:extLst>
       <p:ext uri="{BB962C8B-B14F-4D97-AF65-F5344CB8AC3E}">
@@ -13625,7 +13991,15 @@
                   <a:schemeClr val="bg1"/>
                 </a:solidFill>
               </a:rPr>
-              <a:t> perfettamente bidirezionale</a:t>
+              <a:t> perfettamente </a:t>
+            </a:r>
+            <a:r>
+              <a:rPr lang="it-IT" b="1" dirty="0">
+                <a:solidFill>
+                  <a:schemeClr val="bg1"/>
+                </a:solidFill>
+              </a:rPr>
+              <a:t>bidirezionale</a:t>
             </a:r>
           </a:p>
           <a:p>
@@ -14875,8 +15249,8 @@
           </p:sp>
         </mc:Fallback>
       </mc:AlternateContent>
-      <mc:AlternateContent xmlns:mc="http://schemas.openxmlformats.org/markup-compatibility/2006" xmlns:a14="http://schemas.microsoft.com/office/drawing/2010/main">
-        <mc:Choice Requires="a14">
+      <mc:AlternateContent xmlns:mc="http://schemas.openxmlformats.org/markup-compatibility/2006">
+        <mc:Choice xmlns:a14="http://schemas.microsoft.com/office/drawing/2010/main" Requires="a14">
           <p:sp>
             <p:nvSpPr>
               <p:cNvPr id="20" name="CasellaDiTesto 19">
@@ -15010,7 +15384,7 @@
             </p:txBody>
           </p:sp>
         </mc:Choice>
-        <mc:Fallback xmlns="">
+        <mc:Fallback>
           <p:sp>
             <p:nvSpPr>
               <p:cNvPr id="20" name="CasellaDiTesto 19">
@@ -15055,8 +15429,8 @@
           </p:sp>
         </mc:Fallback>
       </mc:AlternateContent>
-      <mc:AlternateContent xmlns:mc="http://schemas.openxmlformats.org/markup-compatibility/2006" xmlns:a14="http://schemas.microsoft.com/office/drawing/2010/main">
-        <mc:Choice Requires="a14">
+      <mc:AlternateContent xmlns:mc="http://schemas.openxmlformats.org/markup-compatibility/2006">
+        <mc:Choice xmlns:a14="http://schemas.microsoft.com/office/drawing/2010/main" Requires="a14">
           <p:sp>
             <p:nvSpPr>
               <p:cNvPr id="21" name="CasellaDiTesto 20">
@@ -15071,7 +15445,7 @@
             </p:nvSpPr>
             <p:spPr>
               <a:xfrm>
-                <a:off x="4739532" y="4954697"/>
+                <a:off x="4739532" y="4999087"/>
                 <a:ext cx="2838982" cy="369332"/>
               </a:xfrm>
               <a:prstGeom prst="rect">
@@ -15294,7 +15668,7 @@
             </p:txBody>
           </p:sp>
         </mc:Choice>
-        <mc:Fallback xmlns="">
+        <mc:Fallback>
           <p:sp>
             <p:nvSpPr>
               <p:cNvPr id="21" name="CasellaDiTesto 20">
@@ -15311,7 +15685,7 @@
             </p:nvSpPr>
             <p:spPr>
               <a:xfrm>
-                <a:off x="4739532" y="4954697"/>
+                <a:off x="4739532" y="4999087"/>
                 <a:ext cx="2838982" cy="369332"/>
               </a:xfrm>
               <a:prstGeom prst="rect">
@@ -15320,7 +15694,7 @@
               <a:blipFill>
                 <a:blip r:embed="rId11"/>
                 <a:stretch>
-                  <a:fillRect l="-1931" r="-215" b="-36667"/>
+                  <a:fillRect l="-1931" r="-215" b="-36066"/>
                 </a:stretch>
               </a:blipFill>
             </p:spPr>
@@ -15339,8 +15713,8 @@
           </p:sp>
         </mc:Fallback>
       </mc:AlternateContent>
-      <mc:AlternateContent xmlns:mc="http://schemas.openxmlformats.org/markup-compatibility/2006" xmlns:a14="http://schemas.microsoft.com/office/drawing/2010/main">
-        <mc:Choice Requires="a14">
+      <mc:AlternateContent xmlns:mc="http://schemas.openxmlformats.org/markup-compatibility/2006">
+        <mc:Choice xmlns:a14="http://schemas.microsoft.com/office/drawing/2010/main" Requires="a14">
           <p:sp>
             <p:nvSpPr>
               <p:cNvPr id="24" name="CasellaDiTesto 23">
@@ -15355,8 +15729,8 @@
             </p:nvSpPr>
             <p:spPr>
               <a:xfrm>
-                <a:off x="4175991" y="5525829"/>
-                <a:ext cx="4066947" cy="369332"/>
+                <a:off x="4896209" y="5504466"/>
+                <a:ext cx="2525628" cy="924869"/>
               </a:xfrm>
               <a:prstGeom prst="rect">
                 <a:avLst/>
@@ -15369,112 +15743,215 @@
               </a:bodyPr>
               <a:lstStyle/>
               <a:p>
+                <a:pPr/>
+                <a14:m>
+                  <m:oMathPara xmlns:m="http://schemas.openxmlformats.org/officeDocument/2006/math">
+                    <m:oMathParaPr>
+                      <m:jc m:val="left"/>
+                    </m:oMathParaPr>
+                    <m:oMath xmlns:m="http://schemas.openxmlformats.org/officeDocument/2006/math">
+                      <m:sSub>
+                        <m:sSubPr>
+                          <m:ctrlPr>
+                            <a:rPr lang="it-IT" i="1" smtClean="0">
+                              <a:solidFill>
+                                <a:schemeClr val="bg1"/>
+                              </a:solidFill>
+                              <a:latin typeface="Cambria Math" panose="02040503050406030204" pitchFamily="18" charset="0"/>
+                            </a:rPr>
+                          </m:ctrlPr>
+                        </m:sSubPr>
+                        <m:e>
+                          <m:r>
+                            <a:rPr lang="it-IT" b="0" i="1" smtClean="0">
+                              <a:solidFill>
+                                <a:schemeClr val="bg1"/>
+                              </a:solidFill>
+                              <a:latin typeface="Cambria Math" panose="02040503050406030204" pitchFamily="18" charset="0"/>
+                            </a:rPr>
+                            <m:t>𝑎</m:t>
+                          </m:r>
+                        </m:e>
+                        <m:sub>
+                          <m:r>
+                            <a:rPr lang="it-IT" b="0" i="1" smtClean="0">
+                              <a:solidFill>
+                                <a:schemeClr val="bg1"/>
+                              </a:solidFill>
+                              <a:latin typeface="Cambria Math" panose="02040503050406030204" pitchFamily="18" charset="0"/>
+                            </a:rPr>
+                            <m:t>1</m:t>
+                          </m:r>
+                        </m:sub>
+                      </m:sSub>
+                      <m:r>
+                        <a:rPr lang="it-IT" b="0" i="1" smtClean="0">
+                          <a:solidFill>
+                            <a:schemeClr val="bg1"/>
+                          </a:solidFill>
+                          <a:latin typeface="Cambria Math" panose="02040503050406030204" pitchFamily="18" charset="0"/>
+                        </a:rPr>
+                        <m:t>=3,883</m:t>
+                      </m:r>
+                      <m:r>
+                        <a:rPr lang="it-IT" b="0" i="1" smtClean="0">
+                          <a:solidFill>
+                            <a:schemeClr val="bg1"/>
+                          </a:solidFill>
+                          <a:latin typeface="Cambria Math" panose="02040503050406030204" pitchFamily="18" charset="0"/>
+                          <a:ea typeface="Cambria Math" panose="02040503050406030204" pitchFamily="18" charset="0"/>
+                        </a:rPr>
+                        <m:t>∙</m:t>
+                      </m:r>
+                      <m:sSup>
+                        <m:sSupPr>
+                          <m:ctrlPr>
+                            <a:rPr lang="it-IT" b="0" i="1" smtClean="0">
+                              <a:solidFill>
+                                <a:schemeClr val="bg1"/>
+                              </a:solidFill>
+                              <a:latin typeface="Cambria Math" panose="02040503050406030204" pitchFamily="18" charset="0"/>
+                              <a:ea typeface="Cambria Math" panose="02040503050406030204" pitchFamily="18" charset="0"/>
+                            </a:rPr>
+                          </m:ctrlPr>
+                        </m:sSupPr>
+                        <m:e>
+                          <m:r>
+                            <a:rPr lang="it-IT" b="0" i="1" smtClean="0">
+                              <a:solidFill>
+                                <a:schemeClr val="bg1"/>
+                              </a:solidFill>
+                              <a:latin typeface="Cambria Math" panose="02040503050406030204" pitchFamily="18" charset="0"/>
+                              <a:ea typeface="Cambria Math" panose="02040503050406030204" pitchFamily="18" charset="0"/>
+                            </a:rPr>
+                            <m:t>10</m:t>
+                          </m:r>
+                        </m:e>
+                        <m:sup>
+                          <m:r>
+                            <a:rPr lang="it-IT" b="0" i="1" smtClean="0">
+                              <a:solidFill>
+                                <a:schemeClr val="bg1"/>
+                              </a:solidFill>
+                              <a:latin typeface="Cambria Math" panose="02040503050406030204" pitchFamily="18" charset="0"/>
+                              <a:ea typeface="Cambria Math" panose="02040503050406030204" pitchFamily="18" charset="0"/>
+                            </a:rPr>
+                            <m:t>−4</m:t>
+                          </m:r>
+                        </m:sup>
+                      </m:sSup>
+                      <m:f>
+                        <m:fPr>
+                          <m:ctrlPr>
+                            <a:rPr lang="it-IT" b="0" i="1" smtClean="0">
+                              <a:solidFill>
+                                <a:schemeClr val="bg1"/>
+                              </a:solidFill>
+                              <a:latin typeface="Cambria Math" panose="02040503050406030204" pitchFamily="18" charset="0"/>
+                              <a:ea typeface="Cambria Math" panose="02040503050406030204" pitchFamily="18" charset="0"/>
+                            </a:rPr>
+                          </m:ctrlPr>
+                        </m:fPr>
+                        <m:num>
+                          <m:r>
+                            <a:rPr lang="it-IT" b="0" i="1" smtClean="0">
+                              <a:solidFill>
+                                <a:schemeClr val="bg1"/>
+                              </a:solidFill>
+                              <a:latin typeface="Cambria Math" panose="02040503050406030204" pitchFamily="18" charset="0"/>
+                              <a:ea typeface="Cambria Math" panose="02040503050406030204" pitchFamily="18" charset="0"/>
+                            </a:rPr>
+                            <m:t>𝑘𝑔</m:t>
+                          </m:r>
+                          <m:r>
+                            <a:rPr lang="it-IT" b="0" i="1" smtClean="0">
+                              <a:solidFill>
+                                <a:schemeClr val="bg1"/>
+                              </a:solidFill>
+                              <a:latin typeface="Cambria Math" panose="02040503050406030204" pitchFamily="18" charset="0"/>
+                              <a:ea typeface="Cambria Math" panose="02040503050406030204" pitchFamily="18" charset="0"/>
+                            </a:rPr>
+                            <m:t>∙</m:t>
+                          </m:r>
+                          <m:r>
+                            <a:rPr lang="it-IT" b="0" i="1" smtClean="0">
+                              <a:solidFill>
+                                <a:schemeClr val="bg1"/>
+                              </a:solidFill>
+                              <a:latin typeface="Cambria Math" panose="02040503050406030204" pitchFamily="18" charset="0"/>
+                              <a:ea typeface="Cambria Math" panose="02040503050406030204" pitchFamily="18" charset="0"/>
+                            </a:rPr>
+                            <m:t>𝑚</m:t>
+                          </m:r>
+                        </m:num>
+                        <m:den>
+                          <m:sSup>
+                            <m:sSupPr>
+                              <m:ctrlPr>
+                                <a:rPr lang="it-IT" b="0" i="1" smtClean="0">
+                                  <a:solidFill>
+                                    <a:schemeClr val="bg1"/>
+                                  </a:solidFill>
+                                  <a:latin typeface="Cambria Math" panose="02040503050406030204" pitchFamily="18" charset="0"/>
+                                  <a:ea typeface="Cambria Math" panose="02040503050406030204" pitchFamily="18" charset="0"/>
+                                </a:rPr>
+                              </m:ctrlPr>
+                            </m:sSupPr>
+                            <m:e>
+                              <m:r>
+                                <a:rPr lang="it-IT" b="0" i="1" smtClean="0">
+                                  <a:solidFill>
+                                    <a:schemeClr val="bg1"/>
+                                  </a:solidFill>
+                                  <a:latin typeface="Cambria Math" panose="02040503050406030204" pitchFamily="18" charset="0"/>
+                                  <a:ea typeface="Cambria Math" panose="02040503050406030204" pitchFamily="18" charset="0"/>
+                                </a:rPr>
+                                <m:t>𝑟𝑎𝑑</m:t>
+                              </m:r>
+                            </m:e>
+                            <m:sup>
+                              <m:r>
+                                <a:rPr lang="it-IT" b="0" i="1" smtClean="0">
+                                  <a:solidFill>
+                                    <a:schemeClr val="bg1"/>
+                                  </a:solidFill>
+                                  <a:latin typeface="Cambria Math" panose="02040503050406030204" pitchFamily="18" charset="0"/>
+                                  <a:ea typeface="Cambria Math" panose="02040503050406030204" pitchFamily="18" charset="0"/>
+                                </a:rPr>
+                                <m:t>2</m:t>
+                              </m:r>
+                            </m:sup>
+                          </m:sSup>
+                        </m:den>
+                      </m:f>
+                      <m:r>
+                        <a:rPr lang="it-IT" b="0" i="1" smtClean="0">
+                          <a:solidFill>
+                            <a:schemeClr val="bg1"/>
+                          </a:solidFill>
+                          <a:latin typeface="Cambria Math" panose="02040503050406030204" pitchFamily="18" charset="0"/>
+                          <a:ea typeface="Cambria Math" panose="02040503050406030204" pitchFamily="18" charset="0"/>
+                        </a:rPr>
+                        <m:t> </m:t>
+                      </m:r>
+                    </m:oMath>
+                  </m:oMathPara>
+                </a14:m>
+                <a:endParaRPr lang="it-IT" b="0" i="1" dirty="0">
+                  <a:solidFill>
+                    <a:schemeClr val="bg1"/>
+                  </a:solidFill>
+                  <a:latin typeface="Cambria Math" panose="02040503050406030204" pitchFamily="18" charset="0"/>
+                  <a:ea typeface="Cambria Math" panose="02040503050406030204" pitchFamily="18" charset="0"/>
+                </a:endParaRPr>
+              </a:p>
+              <a:p>
                 <a14:m>
                   <m:oMath xmlns:m="http://schemas.openxmlformats.org/officeDocument/2006/math">
                     <m:sSub>
                       <m:sSubPr>
                         <m:ctrlPr>
-                          <a:rPr lang="it-IT" sz="2400" i="1" smtClean="0">
-                            <a:solidFill>
-                              <a:schemeClr val="bg1"/>
-                            </a:solidFill>
-                            <a:latin typeface="Cambria Math" panose="02040503050406030204" pitchFamily="18" charset="0"/>
-                          </a:rPr>
-                        </m:ctrlPr>
-                      </m:sSubPr>
-                      <m:e>
-                        <m:r>
-                          <a:rPr lang="it-IT" sz="2400" b="0" i="1" smtClean="0">
-                            <a:solidFill>
-                              <a:schemeClr val="bg1"/>
-                            </a:solidFill>
-                            <a:latin typeface="Cambria Math" panose="02040503050406030204" pitchFamily="18" charset="0"/>
-                          </a:rPr>
-                          <m:t>𝑎</m:t>
-                        </m:r>
-                      </m:e>
-                      <m:sub>
-                        <m:r>
-                          <a:rPr lang="it-IT" sz="2400" b="0" i="1" smtClean="0">
-                            <a:solidFill>
-                              <a:schemeClr val="bg1"/>
-                            </a:solidFill>
-                            <a:latin typeface="Cambria Math" panose="02040503050406030204" pitchFamily="18" charset="0"/>
-                          </a:rPr>
-                          <m:t>1</m:t>
-                        </m:r>
-                      </m:sub>
-                    </m:sSub>
-                    <m:r>
-                      <a:rPr lang="it-IT" sz="2400" b="0" i="1" smtClean="0">
-                        <a:solidFill>
-                          <a:schemeClr val="bg1"/>
-                        </a:solidFill>
-                        <a:latin typeface="Cambria Math" panose="02040503050406030204" pitchFamily="18" charset="0"/>
-                      </a:rPr>
-                      <m:t>=3,883</m:t>
-                    </m:r>
-                    <m:r>
-                      <a:rPr lang="it-IT" sz="2400" b="0" i="1" smtClean="0">
-                        <a:solidFill>
-                          <a:schemeClr val="bg1"/>
-                        </a:solidFill>
-                        <a:latin typeface="Cambria Math" panose="02040503050406030204" pitchFamily="18" charset="0"/>
-                        <a:ea typeface="Cambria Math" panose="02040503050406030204" pitchFamily="18" charset="0"/>
-                      </a:rPr>
-                      <m:t>∙</m:t>
-                    </m:r>
-                    <m:sSup>
-                      <m:sSupPr>
-                        <m:ctrlPr>
-                          <a:rPr lang="it-IT" sz="2400" b="0" i="1" smtClean="0">
-                            <a:solidFill>
-                              <a:schemeClr val="bg1"/>
-                            </a:solidFill>
-                            <a:latin typeface="Cambria Math" panose="02040503050406030204" pitchFamily="18" charset="0"/>
-                            <a:ea typeface="Cambria Math" panose="02040503050406030204" pitchFamily="18" charset="0"/>
-                          </a:rPr>
-                        </m:ctrlPr>
-                      </m:sSupPr>
-                      <m:e>
-                        <m:r>
-                          <a:rPr lang="it-IT" sz="2400" b="0" i="1" smtClean="0">
-                            <a:solidFill>
-                              <a:schemeClr val="bg1"/>
-                            </a:solidFill>
-                            <a:latin typeface="Cambria Math" panose="02040503050406030204" pitchFamily="18" charset="0"/>
-                            <a:ea typeface="Cambria Math" panose="02040503050406030204" pitchFamily="18" charset="0"/>
-                          </a:rPr>
-                          <m:t>10</m:t>
-                        </m:r>
-                      </m:e>
-                      <m:sup>
-                        <m:r>
-                          <a:rPr lang="it-IT" sz="2400" b="0" i="1" smtClean="0">
-                            <a:solidFill>
-                              <a:schemeClr val="bg1"/>
-                            </a:solidFill>
-                            <a:latin typeface="Cambria Math" panose="02040503050406030204" pitchFamily="18" charset="0"/>
-                            <a:ea typeface="Cambria Math" panose="02040503050406030204" pitchFamily="18" charset="0"/>
-                          </a:rPr>
-                          <m:t>−4</m:t>
-                        </m:r>
-                      </m:sup>
-                    </m:sSup>
-                    <m:r>
-                      <a:rPr lang="it-IT" sz="2400" b="0" i="1" smtClean="0">
-                        <a:solidFill>
-                          <a:schemeClr val="bg1"/>
-                        </a:solidFill>
-                        <a:latin typeface="Cambria Math" panose="02040503050406030204" pitchFamily="18" charset="0"/>
-                        <a:ea typeface="Cambria Math" panose="02040503050406030204" pitchFamily="18" charset="0"/>
-                      </a:rPr>
-                      <m:t>, </m:t>
-                    </m:r>
-                    <m:sSub>
-                      <m:sSubPr>
-                        <m:ctrlPr>
-                          <a:rPr lang="it-IT" sz="2400" b="0" i="1" smtClean="0">
+                          <a:rPr lang="it-IT" b="0" i="1" smtClean="0">
                             <a:solidFill>
                               <a:schemeClr val="bg1"/>
                             </a:solidFill>
@@ -15485,7 +15962,7 @@
                       </m:sSubPr>
                       <m:e>
                         <m:r>
-                          <a:rPr lang="it-IT" sz="2400" b="0" i="1" smtClean="0">
+                          <a:rPr lang="it-IT" b="0" i="1" smtClean="0">
                             <a:solidFill>
                               <a:schemeClr val="bg1"/>
                             </a:solidFill>
@@ -15497,7 +15974,7 @@
                       </m:e>
                       <m:sub>
                         <m:r>
-                          <a:rPr lang="it-IT" sz="2400" b="0" i="1" smtClean="0">
+                          <a:rPr lang="it-IT" b="0" i="1" smtClean="0">
                             <a:solidFill>
                               <a:schemeClr val="bg1"/>
                             </a:solidFill>
@@ -15509,7 +15986,7 @@
                       </m:sub>
                     </m:sSub>
                     <m:r>
-                      <a:rPr lang="it-IT" sz="2400" b="0" i="1" smtClean="0">
+                      <a:rPr lang="it-IT" b="0" i="1" smtClean="0">
                         <a:solidFill>
                           <a:schemeClr val="bg1"/>
                         </a:solidFill>
@@ -15518,22 +15995,69 @@
                       </a:rPr>
                       <m:t>=0,003</m:t>
                     </m:r>
+                    <m:r>
+                      <a:rPr lang="it-IT" b="0" i="1" smtClean="0">
+                        <a:solidFill>
+                          <a:schemeClr val="bg1"/>
+                        </a:solidFill>
+                        <a:latin typeface="Cambria Math" panose="02040503050406030204" pitchFamily="18" charset="0"/>
+                        <a:ea typeface="Cambria Math" panose="02040503050406030204" pitchFamily="18" charset="0"/>
+                      </a:rPr>
+                      <m:t>7 </m:t>
+                    </m:r>
+                    <m:f>
+                      <m:fPr>
+                        <m:ctrlPr>
+                          <a:rPr lang="it-IT" b="0" i="1" smtClean="0">
+                            <a:solidFill>
+                              <a:schemeClr val="bg1"/>
+                            </a:solidFill>
+                            <a:latin typeface="Cambria Math" panose="02040503050406030204" pitchFamily="18" charset="0"/>
+                            <a:ea typeface="Cambria Math" panose="02040503050406030204" pitchFamily="18" charset="0"/>
+                          </a:rPr>
+                        </m:ctrlPr>
+                      </m:fPr>
+                      <m:num>
+                        <m:r>
+                          <a:rPr lang="it-IT" b="0" i="1" smtClean="0">
+                            <a:solidFill>
+                              <a:schemeClr val="bg1"/>
+                            </a:solidFill>
+                            <a:latin typeface="Cambria Math" panose="02040503050406030204" pitchFamily="18" charset="0"/>
+                            <a:ea typeface="Cambria Math" panose="02040503050406030204" pitchFamily="18" charset="0"/>
+                          </a:rPr>
+                          <m:t>𝑘𝑔</m:t>
+                        </m:r>
+                      </m:num>
+                      <m:den>
+                        <m:r>
+                          <a:rPr lang="it-IT" b="0" i="1" smtClean="0">
+                            <a:solidFill>
+                              <a:schemeClr val="bg1"/>
+                            </a:solidFill>
+                            <a:latin typeface="Cambria Math" panose="02040503050406030204" pitchFamily="18" charset="0"/>
+                            <a:ea typeface="Cambria Math" panose="02040503050406030204" pitchFamily="18" charset="0"/>
+                          </a:rPr>
+                          <m:t>𝑟𝑎𝑑</m:t>
+                        </m:r>
+                      </m:den>
+                    </m:f>
                   </m:oMath>
                 </a14:m>
                 <a:r>
-                  <a:rPr lang="it-IT" sz="2400" b="0" dirty="0">
+                  <a:rPr lang="it-IT" b="0" dirty="0">
                     <a:solidFill>
                       <a:schemeClr val="bg1"/>
                     </a:solidFill>
                     <a:ea typeface="Cambria Math" panose="02040503050406030204" pitchFamily="18" charset="0"/>
                   </a:rPr>
-                  <a:t>7</a:t>
+                  <a:t> </a:t>
                 </a:r>
               </a:p>
             </p:txBody>
           </p:sp>
         </mc:Choice>
-        <mc:Fallback xmlns="">
+        <mc:Fallback>
           <p:sp>
             <p:nvSpPr>
               <p:cNvPr id="24" name="CasellaDiTesto 23">
@@ -15550,8 +16074,8 @@
             </p:nvSpPr>
             <p:spPr>
               <a:xfrm>
-                <a:off x="4175991" y="5525829"/>
-                <a:ext cx="4066947" cy="369332"/>
+                <a:off x="4896209" y="5504466"/>
+                <a:ext cx="2525628" cy="924869"/>
               </a:xfrm>
               <a:prstGeom prst="rect">
                 <a:avLst/>
@@ -15559,7 +16083,7 @@
               <a:blipFill>
                 <a:blip r:embed="rId12"/>
                 <a:stretch>
-                  <a:fillRect l="-1799" t="-22951" r="-3748" b="-50820"/>
+                  <a:fillRect l="-2415" b="-5263"/>
                 </a:stretch>
               </a:blipFill>
             </p:spPr>
@@ -15592,8 +16116,8 @@
         </p:nvSpPr>
         <p:spPr>
           <a:xfrm>
-            <a:off x="3964061" y="4890136"/>
-            <a:ext cx="4432437" cy="1045654"/>
+            <a:off x="4497134" y="4890135"/>
+            <a:ext cx="3308327" cy="1697095"/>
           </a:xfrm>
           <a:prstGeom prst="rect">
             <a:avLst/>
@@ -15628,10 +16152,10 @@
       </p:sp>
       <p:sp>
         <p:nvSpPr>
-          <p:cNvPr id="26" name="Segnaposto numero diapositiva 25">
+          <p:cNvPr id="2" name="Segnaposto numero diapositiva 1">
             <a:extLst>
               <a:ext uri="{FF2B5EF4-FFF2-40B4-BE49-F238E27FC236}">
-                <a16:creationId xmlns:a16="http://schemas.microsoft.com/office/drawing/2014/main" id="{298311C5-41EB-4906-93C6-889FAFBCE7F2}"/>
+                <a16:creationId xmlns:a16="http://schemas.microsoft.com/office/drawing/2014/main" id="{5889C3A8-086C-4048-A130-64AC5CC225BA}"/>
               </a:ext>
             </a:extLst>
           </p:cNvPr>
@@ -18807,10 +19331,10 @@
       </p:sp>
       <p:sp>
         <p:nvSpPr>
-          <p:cNvPr id="7" name="Segnaposto numero diapositiva 6">
+          <p:cNvPr id="3" name="Segnaposto numero diapositiva 2">
             <a:extLst>
               <a:ext uri="{FF2B5EF4-FFF2-40B4-BE49-F238E27FC236}">
-                <a16:creationId xmlns:a16="http://schemas.microsoft.com/office/drawing/2014/main" id="{0D02E9DE-BB3B-4DD8-BA62-BFC629AE7678}"/>
+                <a16:creationId xmlns:a16="http://schemas.microsoft.com/office/drawing/2014/main" id="{FAEE095C-487C-463F-B0F1-0B4EDB0E67DA}"/>
               </a:ext>
             </a:extLst>
           </p:cNvPr>
@@ -18831,6 +19355,96 @@
               <a:t>7</a:t>
             </a:fld>
             <a:endParaRPr lang="en-US"/>
+          </a:p>
+        </p:txBody>
+      </p:sp>
+      <p:sp>
+        <p:nvSpPr>
+          <p:cNvPr id="10" name="Parentesi graffa aperta 9">
+            <a:extLst>
+              <a:ext uri="{FF2B5EF4-FFF2-40B4-BE49-F238E27FC236}">
+                <a16:creationId xmlns:a16="http://schemas.microsoft.com/office/drawing/2014/main" id="{AB7FF866-140D-4BDF-BE95-AC336B0CAE10}"/>
+              </a:ext>
+            </a:extLst>
+          </p:cNvPr>
+          <p:cNvSpPr/>
+          <p:nvPr/>
+        </p:nvSpPr>
+        <p:spPr>
+          <a:xfrm rot="5400000">
+            <a:off x="8095529" y="3301556"/>
+            <a:ext cx="219964" cy="3343946"/>
+          </a:xfrm>
+          <a:prstGeom prst="leftBrace">
+            <a:avLst>
+              <a:gd name="adj1" fmla="val 30957"/>
+              <a:gd name="adj2" fmla="val 50000"/>
+            </a:avLst>
+          </a:prstGeom>
+          <a:ln w="28575">
+            <a:solidFill>
+              <a:schemeClr val="bg1"/>
+            </a:solidFill>
+          </a:ln>
+        </p:spPr>
+        <p:style>
+          <a:lnRef idx="1">
+            <a:schemeClr val="accent1"/>
+          </a:lnRef>
+          <a:fillRef idx="0">
+            <a:schemeClr val="accent1"/>
+          </a:fillRef>
+          <a:effectRef idx="0">
+            <a:schemeClr val="accent1"/>
+          </a:effectRef>
+          <a:fontRef idx="minor">
+            <a:schemeClr val="tx1"/>
+          </a:fontRef>
+        </p:style>
+        <p:txBody>
+          <a:bodyPr rtlCol="0" anchor="ctr"/>
+          <a:lstStyle/>
+          <a:p>
+            <a:pPr algn="ctr"/>
+            <a:endParaRPr lang="it-IT"/>
+          </a:p>
+        </p:txBody>
+      </p:sp>
+      <p:sp>
+        <p:nvSpPr>
+          <p:cNvPr id="16" name="Rettangolo 15">
+            <a:extLst>
+              <a:ext uri="{FF2B5EF4-FFF2-40B4-BE49-F238E27FC236}">
+                <a16:creationId xmlns:a16="http://schemas.microsoft.com/office/drawing/2014/main" id="{8CA8ED43-BAFB-422D-B875-1C358E520A56}"/>
+              </a:ext>
+            </a:extLst>
+          </p:cNvPr>
+          <p:cNvSpPr/>
+          <p:nvPr/>
+        </p:nvSpPr>
+        <p:spPr>
+          <a:xfrm>
+            <a:off x="7874497" y="4425159"/>
+            <a:ext cx="721266" cy="369332"/>
+          </a:xfrm>
+          <a:prstGeom prst="rect">
+            <a:avLst/>
+          </a:prstGeom>
+        </p:spPr>
+        <p:txBody>
+          <a:bodyPr wrap="square">
+            <a:spAutoFit/>
+          </a:bodyPr>
+          <a:lstStyle/>
+          <a:p>
+            <a:r>
+              <a:rPr lang="it-IT" dirty="0">
+                <a:solidFill>
+                  <a:schemeClr val="bg1"/>
+                </a:solidFill>
+              </a:rPr>
+              <a:t>TAM</a:t>
+            </a:r>
           </a:p>
         </p:txBody>
       </p:sp>
@@ -18950,8 +19564,8 @@
           </a:p>
         </p:txBody>
       </p:sp>
-      <mc:AlternateContent xmlns:mc="http://schemas.openxmlformats.org/markup-compatibility/2006">
-        <mc:Choice xmlns:a14="http://schemas.microsoft.com/office/drawing/2010/main" Requires="a14">
+      <mc:AlternateContent xmlns:mc="http://schemas.openxmlformats.org/markup-compatibility/2006" xmlns:a14="http://schemas.microsoft.com/office/drawing/2010/main">
+        <mc:Choice Requires="a14">
           <p:sp>
             <p:nvSpPr>
               <p:cNvPr id="2" name="CasellaDiTesto 1">
@@ -19070,7 +19684,7 @@
             </p:txBody>
           </p:sp>
         </mc:Choice>
-        <mc:Fallback>
+        <mc:Fallback xmlns="">
           <p:sp>
             <p:nvSpPr>
               <p:cNvPr id="2" name="CasellaDiTesto 1">
@@ -19115,8 +19729,8 @@
           </p:sp>
         </mc:Fallback>
       </mc:AlternateContent>
-      <mc:AlternateContent xmlns:mc="http://schemas.openxmlformats.org/markup-compatibility/2006">
-        <mc:Choice xmlns:a14="http://schemas.microsoft.com/office/drawing/2010/main" Requires="a14">
+      <mc:AlternateContent xmlns:mc="http://schemas.openxmlformats.org/markup-compatibility/2006" xmlns:a14="http://schemas.microsoft.com/office/drawing/2010/main">
+        <mc:Choice Requires="a14">
           <p:sp>
             <p:nvSpPr>
               <p:cNvPr id="7" name="CasellaDiTesto 6">
@@ -19417,7 +20031,7 @@
             </p:txBody>
           </p:sp>
         </mc:Choice>
-        <mc:Fallback>
+        <mc:Fallback xmlns="">
           <p:sp>
             <p:nvSpPr>
               <p:cNvPr id="7" name="CasellaDiTesto 6">
@@ -19462,8 +20076,8 @@
           </p:sp>
         </mc:Fallback>
       </mc:AlternateContent>
-      <mc:AlternateContent xmlns:mc="http://schemas.openxmlformats.org/markup-compatibility/2006">
-        <mc:Choice xmlns:a14="http://schemas.microsoft.com/office/drawing/2010/main" Requires="a14">
+      <mc:AlternateContent xmlns:mc="http://schemas.openxmlformats.org/markup-compatibility/2006" xmlns:a14="http://schemas.microsoft.com/office/drawing/2010/main">
+        <mc:Choice Requires="a14">
           <p:sp>
             <p:nvSpPr>
               <p:cNvPr id="14" name="CasellaDiTesto 13">
@@ -19641,7 +20255,7 @@
             </p:txBody>
           </p:sp>
         </mc:Choice>
-        <mc:Fallback>
+        <mc:Fallback xmlns="">
           <p:sp>
             <p:nvSpPr>
               <p:cNvPr id="14" name="CasellaDiTesto 13">
@@ -19814,120 +20428,12 @@
           </a:prstGeom>
         </p:spPr>
       </p:pic>
-      <p:pic>
-        <p:nvPicPr>
-          <p:cNvPr id="26" name="Immagine 25">
-            <a:extLst>
-              <a:ext uri="{FF2B5EF4-FFF2-40B4-BE49-F238E27FC236}">
-                <a16:creationId xmlns:a16="http://schemas.microsoft.com/office/drawing/2014/main" id="{470A0DFB-3589-4AF6-8C22-4D1F6A6647C7}"/>
-              </a:ext>
-            </a:extLst>
-          </p:cNvPr>
-          <p:cNvPicPr>
-            <a:picLocks noChangeAspect="1"/>
-          </p:cNvPicPr>
-          <p:nvPr/>
-        </p:nvPicPr>
-        <p:blipFill>
-          <a:blip r:embed="rId8">
-            <a:extLst>
-              <a:ext uri="{28A0092B-C50C-407E-A947-70E740481C1C}">
-                <a14:useLocalDpi xmlns:a14="http://schemas.microsoft.com/office/drawing/2010/main" val="0"/>
-              </a:ext>
-            </a:extLst>
-          </a:blip>
-          <a:stretch>
-            <a:fillRect/>
-          </a:stretch>
-        </p:blipFill>
-        <p:spPr>
-          <a:xfrm>
-            <a:off x="1002277" y="4652342"/>
-            <a:ext cx="2938613" cy="828839"/>
-          </a:xfrm>
-          <a:prstGeom prst="rect">
-            <a:avLst/>
-          </a:prstGeom>
-        </p:spPr>
-      </p:pic>
-      <p:pic>
-        <p:nvPicPr>
-          <p:cNvPr id="34" name="Immagine 33">
-            <a:extLst>
-              <a:ext uri="{FF2B5EF4-FFF2-40B4-BE49-F238E27FC236}">
-                <a16:creationId xmlns:a16="http://schemas.microsoft.com/office/drawing/2014/main" id="{268227B2-7FBF-4EEB-8AC9-CE283E126A4A}"/>
-              </a:ext>
-            </a:extLst>
-          </p:cNvPr>
-          <p:cNvPicPr>
-            <a:picLocks noChangeAspect="1"/>
-          </p:cNvPicPr>
-          <p:nvPr/>
-        </p:nvPicPr>
-        <p:blipFill>
-          <a:blip r:embed="rId9">
-            <a:extLst>
-              <a:ext uri="{28A0092B-C50C-407E-A947-70E740481C1C}">
-                <a14:useLocalDpi xmlns:a14="http://schemas.microsoft.com/office/drawing/2010/main" val="0"/>
-              </a:ext>
-            </a:extLst>
-          </a:blip>
-          <a:stretch>
-            <a:fillRect/>
-          </a:stretch>
-        </p:blipFill>
-        <p:spPr>
-          <a:xfrm>
-            <a:off x="1229040" y="5835312"/>
-            <a:ext cx="2351596" cy="303431"/>
-          </a:xfrm>
-          <a:prstGeom prst="rect">
-            <a:avLst/>
-          </a:prstGeom>
-        </p:spPr>
-      </p:pic>
-      <p:pic>
-        <p:nvPicPr>
-          <p:cNvPr id="36" name="Immagine 35">
-            <a:extLst>
-              <a:ext uri="{FF2B5EF4-FFF2-40B4-BE49-F238E27FC236}">
-                <a16:creationId xmlns:a16="http://schemas.microsoft.com/office/drawing/2014/main" id="{DDEE8E4B-2B35-4172-AA68-9579BA000ABD}"/>
-              </a:ext>
-            </a:extLst>
-          </p:cNvPr>
-          <p:cNvPicPr>
-            <a:picLocks noChangeAspect="1"/>
-          </p:cNvPicPr>
-          <p:nvPr/>
-        </p:nvPicPr>
-        <p:blipFill>
-          <a:blip r:embed="rId10">
-            <a:extLst>
-              <a:ext uri="{28A0092B-C50C-407E-A947-70E740481C1C}">
-                <a14:useLocalDpi xmlns:a14="http://schemas.microsoft.com/office/drawing/2010/main" val="0"/>
-              </a:ext>
-            </a:extLst>
-          </a:blip>
-          <a:stretch>
-            <a:fillRect/>
-          </a:stretch>
-        </p:blipFill>
-        <p:spPr>
-          <a:xfrm>
-            <a:off x="1130388" y="3724771"/>
-            <a:ext cx="2757134" cy="628570"/>
-          </a:xfrm>
-          <a:prstGeom prst="rect">
-            <a:avLst/>
-          </a:prstGeom>
-        </p:spPr>
-      </p:pic>
       <p:sp>
         <p:nvSpPr>
-          <p:cNvPr id="5" name="Segnaposto numero diapositiva 4">
+          <p:cNvPr id="3" name="Segnaposto numero diapositiva 2">
             <a:extLst>
               <a:ext uri="{FF2B5EF4-FFF2-40B4-BE49-F238E27FC236}">
-                <a16:creationId xmlns:a16="http://schemas.microsoft.com/office/drawing/2014/main" id="{9F1E40CE-83C4-4381-B6A3-F35167D9206D}"/>
+                <a16:creationId xmlns:a16="http://schemas.microsoft.com/office/drawing/2014/main" id="{152F89B8-03A2-4FA0-A291-663CB9577B79}"/>
               </a:ext>
             </a:extLst>
           </p:cNvPr>
@@ -19951,6 +20457,114 @@
           </a:p>
         </p:txBody>
       </p:sp>
+      <p:pic>
+        <p:nvPicPr>
+          <p:cNvPr id="8" name="Immagine 7" descr="Immagine che contiene disegnando&#10;&#10;Descrizione generata automaticamente">
+            <a:extLst>
+              <a:ext uri="{FF2B5EF4-FFF2-40B4-BE49-F238E27FC236}">
+                <a16:creationId xmlns:a16="http://schemas.microsoft.com/office/drawing/2014/main" id="{D5A59E60-1ADD-4684-8E06-E569DB2BC04D}"/>
+              </a:ext>
+            </a:extLst>
+          </p:cNvPr>
+          <p:cNvPicPr>
+            <a:picLocks noChangeAspect="1"/>
+          </p:cNvPicPr>
+          <p:nvPr/>
+        </p:nvPicPr>
+        <p:blipFill>
+          <a:blip r:embed="rId8">
+            <a:extLst>
+              <a:ext uri="{28A0092B-C50C-407E-A947-70E740481C1C}">
+                <a14:useLocalDpi xmlns:a14="http://schemas.microsoft.com/office/drawing/2010/main" val="0"/>
+              </a:ext>
+            </a:extLst>
+          </a:blip>
+          <a:stretch>
+            <a:fillRect/>
+          </a:stretch>
+        </p:blipFill>
+        <p:spPr>
+          <a:xfrm>
+            <a:off x="989481" y="3696976"/>
+            <a:ext cx="2938613" cy="648866"/>
+          </a:xfrm>
+          <a:prstGeom prst="rect">
+            <a:avLst/>
+          </a:prstGeom>
+        </p:spPr>
+      </p:pic>
+      <p:pic>
+        <p:nvPicPr>
+          <p:cNvPr id="10" name="Immagine 9" descr="Immagine che contiene disegnando&#10;&#10;Descrizione generata automaticamente">
+            <a:extLst>
+              <a:ext uri="{FF2B5EF4-FFF2-40B4-BE49-F238E27FC236}">
+                <a16:creationId xmlns:a16="http://schemas.microsoft.com/office/drawing/2014/main" id="{7491596F-B0DB-4F5F-9898-DB17D338184A}"/>
+              </a:ext>
+            </a:extLst>
+          </p:cNvPr>
+          <p:cNvPicPr>
+            <a:picLocks noChangeAspect="1"/>
+          </p:cNvPicPr>
+          <p:nvPr/>
+        </p:nvPicPr>
+        <p:blipFill>
+          <a:blip r:embed="rId9">
+            <a:extLst>
+              <a:ext uri="{28A0092B-C50C-407E-A947-70E740481C1C}">
+                <a14:useLocalDpi xmlns:a14="http://schemas.microsoft.com/office/drawing/2010/main" val="0"/>
+              </a:ext>
+            </a:extLst>
+          </a:blip>
+          <a:stretch>
+            <a:fillRect/>
+          </a:stretch>
+        </p:blipFill>
+        <p:spPr>
+          <a:xfrm>
+            <a:off x="988468" y="4607131"/>
+            <a:ext cx="2931471" cy="874049"/>
+          </a:xfrm>
+          <a:prstGeom prst="rect">
+            <a:avLst/>
+          </a:prstGeom>
+        </p:spPr>
+      </p:pic>
+      <p:pic>
+        <p:nvPicPr>
+          <p:cNvPr id="13" name="Immagine 12" descr="Immagine che contiene disegnando&#10;&#10;Descrizione generata automaticamente">
+            <a:extLst>
+              <a:ext uri="{FF2B5EF4-FFF2-40B4-BE49-F238E27FC236}">
+                <a16:creationId xmlns:a16="http://schemas.microsoft.com/office/drawing/2014/main" id="{66350826-E7B0-4CCA-B190-90088F9E95EB}"/>
+              </a:ext>
+            </a:extLst>
+          </p:cNvPr>
+          <p:cNvPicPr>
+            <a:picLocks noChangeAspect="1"/>
+          </p:cNvPicPr>
+          <p:nvPr/>
+        </p:nvPicPr>
+        <p:blipFill>
+          <a:blip r:embed="rId10">
+            <a:extLst>
+              <a:ext uri="{28A0092B-C50C-407E-A947-70E740481C1C}">
+                <a14:useLocalDpi xmlns:a14="http://schemas.microsoft.com/office/drawing/2010/main" val="0"/>
+              </a:ext>
+            </a:extLst>
+          </a:blip>
+          <a:stretch>
+            <a:fillRect/>
+          </a:stretch>
+        </p:blipFill>
+        <p:spPr>
+          <a:xfrm>
+            <a:off x="1010093" y="5756174"/>
+            <a:ext cx="3064602" cy="394888"/>
+          </a:xfrm>
+          <a:prstGeom prst="rect">
+            <a:avLst/>
+          </a:prstGeom>
+        </p:spPr>
+      </p:pic>
     </p:spTree>
     <p:extLst>
       <p:ext uri="{BB962C8B-B14F-4D97-AF65-F5344CB8AC3E}">
@@ -20555,7 +21169,7 @@
             <p:spPr>
               <a:xfrm>
                 <a:off x="1128282" y="4266302"/>
-                <a:ext cx="2270814" cy="369332"/>
+                <a:ext cx="2320956" cy="369332"/>
               </a:xfrm>
               <a:prstGeom prst="rect">
                 <a:avLst/>
@@ -20653,24 +21267,40 @@
                         </a:rPr>
                         <m:t>+</m:t>
                       </m:r>
-                      <m:r>
-                        <a:rPr lang="it-IT" b="0" i="1" dirty="0" smtClean="0">
-                          <a:solidFill>
-                            <a:schemeClr val="bg1"/>
-                          </a:solidFill>
-                          <a:latin typeface="Cambria Math" panose="02040503050406030204" pitchFamily="18" charset="0"/>
-                        </a:rPr>
-                        <m:t>𝑀𝑎</m:t>
-                      </m:r>
-                      <m:r>
-                        <a:rPr lang="it-IT" b="0" i="1" baseline="-25000" dirty="0" smtClean="0">
-                          <a:solidFill>
-                            <a:schemeClr val="bg1"/>
-                          </a:solidFill>
-                          <a:latin typeface="Cambria Math" panose="02040503050406030204" pitchFamily="18" charset="0"/>
-                        </a:rPr>
-                        <m:t>𝑑𝑑</m:t>
-                      </m:r>
+                      <m:sSub>
+                        <m:sSubPr>
+                          <m:ctrlPr>
+                            <a:rPr lang="it-IT" i="1" dirty="0" smtClean="0">
+                              <a:solidFill>
+                                <a:schemeClr val="bg1"/>
+                              </a:solidFill>
+                              <a:latin typeface="Cambria Math" panose="02040503050406030204" pitchFamily="18" charset="0"/>
+                            </a:rPr>
+                          </m:ctrlPr>
+                        </m:sSubPr>
+                        <m:e>
+                          <m:r>
+                            <a:rPr lang="it-IT" b="0" i="1" dirty="0" smtClean="0">
+                              <a:solidFill>
+                                <a:schemeClr val="bg1"/>
+                              </a:solidFill>
+                              <a:latin typeface="Cambria Math" panose="02040503050406030204" pitchFamily="18" charset="0"/>
+                            </a:rPr>
+                            <m:t>𝑀</m:t>
+                          </m:r>
+                        </m:e>
+                        <m:sub>
+                          <m:r>
+                            <a:rPr lang="it-IT" b="0" i="1" dirty="0" smtClean="0">
+                              <a:solidFill>
+                                <a:schemeClr val="bg1"/>
+                              </a:solidFill>
+                              <a:latin typeface="Cambria Math" panose="02040503050406030204" pitchFamily="18" charset="0"/>
+                            </a:rPr>
+                            <m:t>𝑎𝑑𝑑</m:t>
+                          </m:r>
+                        </m:sub>
+                      </m:sSub>
                       <m:r>
                         <a:rPr lang="it-IT" i="1" dirty="0">
                           <a:solidFill>
@@ -20710,7 +21340,7 @@
             <p:spPr>
               <a:xfrm>
                 <a:off x="1128282" y="4266302"/>
-                <a:ext cx="2270814" cy="369332"/>
+                <a:ext cx="2320956" cy="369332"/>
               </a:xfrm>
               <a:prstGeom prst="rect">
                 <a:avLst/>
@@ -23218,35 +23848,6 @@
       </mc:AlternateContent>
       <p:sp>
         <p:nvSpPr>
-          <p:cNvPr id="5" name="Segnaposto numero diapositiva 4">
-            <a:extLst>
-              <a:ext uri="{FF2B5EF4-FFF2-40B4-BE49-F238E27FC236}">
-                <a16:creationId xmlns:a16="http://schemas.microsoft.com/office/drawing/2014/main" id="{DBA988ED-180D-4217-8506-1E00DA89F3C7}"/>
-              </a:ext>
-            </a:extLst>
-          </p:cNvPr>
-          <p:cNvSpPr>
-            <a:spLocks noGrp="1"/>
-          </p:cNvSpPr>
-          <p:nvPr>
-            <p:ph type="sldNum" sz="quarter" idx="12"/>
-          </p:nvPr>
-        </p:nvSpPr>
-        <p:spPr/>
-        <p:txBody>
-          <a:bodyPr/>
-          <a:lstStyle/>
-          <a:p>
-            <a:fld id="{4854181D-6920-4594-9A5D-6CE56DC9F8B2}" type="slidenum">
-              <a:rPr lang="en-US" smtClean="0"/>
-              <a:t>9</a:t>
-            </a:fld>
-            <a:endParaRPr lang="en-US"/>
-          </a:p>
-        </p:txBody>
-      </p:sp>
-      <p:sp>
-        <p:nvSpPr>
           <p:cNvPr id="9" name="CasellaDiTesto 8">
             <a:extLst>
               <a:ext uri="{FF2B5EF4-FFF2-40B4-BE49-F238E27FC236}">
@@ -23300,7 +23901,7 @@
             </p:nvSpPr>
             <p:spPr>
               <a:xfrm>
-                <a:off x="1188064" y="4853962"/>
+                <a:off x="1188064" y="4891670"/>
                 <a:ext cx="1010918" cy="810735"/>
               </a:xfrm>
               <a:prstGeom prst="rect">
@@ -23313,7 +23914,6 @@
               </a:bodyPr>
               <a:lstStyle/>
               <a:p>
-                <a:pPr/>
                 <a14:m>
                   <m:oMath xmlns:m="http://schemas.openxmlformats.org/officeDocument/2006/math">
                     <m:sSub>
@@ -23489,7 +24089,7 @@
             </p:nvSpPr>
             <p:spPr>
               <a:xfrm>
-                <a:off x="1188064" y="4853962"/>
+                <a:off x="1188064" y="4891670"/>
                 <a:ext cx="1010918" cy="810735"/>
               </a:xfrm>
               <a:prstGeom prst="rect">
@@ -23517,230 +24117,6 @@
           </p:sp>
         </mc:Fallback>
       </mc:AlternateContent>
-      <mc:AlternateContent xmlns:mc="http://schemas.openxmlformats.org/markup-compatibility/2006">
-        <mc:Choice xmlns:a14="http://schemas.microsoft.com/office/drawing/2010/main" Requires="a14">
-          <p:sp>
-            <p:nvSpPr>
-              <p:cNvPr id="20" name="Rettangolo 19">
-                <a:extLst>
-                  <a:ext uri="{FF2B5EF4-FFF2-40B4-BE49-F238E27FC236}">
-                    <a16:creationId xmlns:a16="http://schemas.microsoft.com/office/drawing/2014/main" id="{9AC29DEA-2E73-4534-A96B-2A3D032FD15A}"/>
-                  </a:ext>
-                </a:extLst>
-              </p:cNvPr>
-              <p:cNvSpPr/>
-              <p:nvPr/>
-            </p:nvSpPr>
-            <p:spPr>
-              <a:xfrm>
-                <a:off x="1188064" y="5771866"/>
-                <a:ext cx="1437445" cy="369332"/>
-              </a:xfrm>
-              <a:prstGeom prst="rect">
-                <a:avLst/>
-              </a:prstGeom>
-            </p:spPr>
-            <p:txBody>
-              <a:bodyPr wrap="none">
-                <a:spAutoFit/>
-              </a:bodyPr>
-              <a:lstStyle/>
-              <a:p>
-                <a14:m>
-                  <m:oMath xmlns:m="http://schemas.openxmlformats.org/officeDocument/2006/math">
-                    <m:r>
-                      <m:rPr>
-                        <m:sty m:val="p"/>
-                      </m:rPr>
-                      <a:rPr lang="it-IT" b="0" i="0" smtClean="0">
-                        <a:solidFill>
-                          <a:schemeClr val="bg1"/>
-                        </a:solidFill>
-                        <a:latin typeface="Cambria Math" panose="02040503050406030204" pitchFamily="18" charset="0"/>
-                      </a:rPr>
-                      <m:t>S</m:t>
-                    </m:r>
-                    <m:r>
-                      <a:rPr lang="it-IT" b="0" i="0" smtClean="0">
-                        <a:solidFill>
-                          <a:schemeClr val="bg1"/>
-                        </a:solidFill>
-                        <a:latin typeface="Cambria Math" panose="02040503050406030204" pitchFamily="18" charset="0"/>
-                      </a:rPr>
-                      <m:t>(</m:t>
-                    </m:r>
-                    <m:sSub>
-                      <m:sSubPr>
-                        <m:ctrlPr>
-                          <a:rPr lang="it-IT" i="1" smtClean="0">
-                            <a:solidFill>
-                              <a:schemeClr val="bg1"/>
-                            </a:solidFill>
-                            <a:latin typeface="Cambria Math" panose="02040503050406030204" pitchFamily="18" charset="0"/>
-                          </a:rPr>
-                        </m:ctrlPr>
-                      </m:sSubPr>
-                      <m:e>
-                        <m:r>
-                          <a:rPr lang="it-IT" b="1" i="1" smtClean="0">
-                            <a:solidFill>
-                              <a:schemeClr val="bg1"/>
-                            </a:solidFill>
-                            <a:latin typeface="Cambria Math" panose="02040503050406030204" pitchFamily="18" charset="0"/>
-                          </a:rPr>
-                          <m:t>𝒓</m:t>
-                        </m:r>
-                      </m:e>
-                      <m:sub>
-                        <m:r>
-                          <a:rPr lang="it-IT" b="0" i="1" smtClean="0">
-                            <a:solidFill>
-                              <a:schemeClr val="bg1"/>
-                            </a:solidFill>
-                            <a:latin typeface="Cambria Math" panose="02040503050406030204" pitchFamily="18" charset="0"/>
-                          </a:rPr>
-                          <m:t>𝐺</m:t>
-                        </m:r>
-                      </m:sub>
-                    </m:sSub>
-                    <m:r>
-                      <a:rPr lang="it-IT" b="0" i="1" smtClean="0">
-                        <a:solidFill>
-                          <a:schemeClr val="bg1"/>
-                        </a:solidFill>
-                        <a:latin typeface="Cambria Math" panose="02040503050406030204" pitchFamily="18" charset="0"/>
-                      </a:rPr>
-                      <m:t>)</m:t>
-                    </m:r>
-                  </m:oMath>
-                </a14:m>
-                <a:r>
-                  <a:rPr lang="it-IT" dirty="0">
-                    <a:solidFill>
-                      <a:schemeClr val="bg1"/>
-                    </a:solidFill>
-                  </a:rPr>
-                  <a:t> =</a:t>
-                </a:r>
-                <a14:m>
-                  <m:oMath xmlns:m="http://schemas.openxmlformats.org/officeDocument/2006/math">
-                    <m:r>
-                      <a:rPr lang="it-IT" b="0" i="0" dirty="0" smtClean="0">
-                        <a:solidFill>
-                          <a:schemeClr val="bg1"/>
-                        </a:solidFill>
-                        <a:latin typeface="Cambria Math" panose="02040503050406030204" pitchFamily="18" charset="0"/>
-                      </a:rPr>
-                      <m:t> </m:t>
-                    </m:r>
-                    <m:sSub>
-                      <m:sSubPr>
-                        <m:ctrlPr>
-                          <a:rPr lang="it-IT" b="0" i="1" dirty="0" smtClean="0">
-                            <a:solidFill>
-                              <a:schemeClr val="bg1"/>
-                            </a:solidFill>
-                            <a:latin typeface="Cambria Math" panose="02040503050406030204" pitchFamily="18" charset="0"/>
-                          </a:rPr>
-                        </m:ctrlPr>
-                      </m:sSubPr>
-                      <m:e>
-                        <m:r>
-                          <a:rPr lang="it-IT" b="0" i="1" dirty="0" smtClean="0">
-                            <a:solidFill>
-                              <a:schemeClr val="bg1"/>
-                            </a:solidFill>
-                            <a:latin typeface="Cambria Math" panose="02040503050406030204" pitchFamily="18" charset="0"/>
-                          </a:rPr>
-                          <m:t>0</m:t>
-                        </m:r>
-                      </m:e>
-                      <m:sub>
-                        <m:r>
-                          <a:rPr lang="it-IT" b="0" i="1" dirty="0" smtClean="0">
-                            <a:solidFill>
-                              <a:schemeClr val="bg1"/>
-                            </a:solidFill>
-                            <a:latin typeface="Cambria Math" panose="02040503050406030204" pitchFamily="18" charset="0"/>
-                          </a:rPr>
-                          <m:t>3</m:t>
-                        </m:r>
-                        <m:r>
-                          <a:rPr lang="it-IT" b="0" i="1" dirty="0" smtClean="0">
-                            <a:solidFill>
-                              <a:schemeClr val="bg1"/>
-                            </a:solidFill>
-                            <a:latin typeface="Cambria Math" panose="02040503050406030204" pitchFamily="18" charset="0"/>
-                          </a:rPr>
-                          <m:t>𝑥</m:t>
-                        </m:r>
-                        <m:r>
-                          <a:rPr lang="it-IT" b="0" i="1" dirty="0" smtClean="0">
-                            <a:solidFill>
-                              <a:schemeClr val="bg1"/>
-                            </a:solidFill>
-                            <a:latin typeface="Cambria Math" panose="02040503050406030204" pitchFamily="18" charset="0"/>
-                          </a:rPr>
-                          <m:t>3</m:t>
-                        </m:r>
-                      </m:sub>
-                    </m:sSub>
-                  </m:oMath>
-                </a14:m>
-                <a:endParaRPr lang="it-IT" dirty="0">
-                  <a:solidFill>
-                    <a:schemeClr val="bg1"/>
-                  </a:solidFill>
-                </a:endParaRPr>
-              </a:p>
-            </p:txBody>
-          </p:sp>
-        </mc:Choice>
-        <mc:Fallback>
-          <p:sp>
-            <p:nvSpPr>
-              <p:cNvPr id="20" name="Rettangolo 19">
-                <a:extLst>
-                  <a:ext uri="{FF2B5EF4-FFF2-40B4-BE49-F238E27FC236}">
-                    <a16:creationId xmlns:a16="http://schemas.microsoft.com/office/drawing/2014/main" id="{9AC29DEA-2E73-4534-A96B-2A3D032FD15A}"/>
-                  </a:ext>
-                </a:extLst>
-              </p:cNvPr>
-              <p:cNvSpPr>
-                <a:spLocks noRot="1" noChangeAspect="1" noMove="1" noResize="1" noEditPoints="1" noAdjustHandles="1" noChangeArrowheads="1" noChangeShapeType="1" noTextEdit="1"/>
-              </p:cNvSpPr>
-              <p:nvPr/>
-            </p:nvSpPr>
-            <p:spPr>
-              <a:xfrm>
-                <a:off x="1188064" y="5771866"/>
-                <a:ext cx="1437445" cy="369332"/>
-              </a:xfrm>
-              <a:prstGeom prst="rect">
-                <a:avLst/>
-              </a:prstGeom>
-              <a:blipFill>
-                <a:blip r:embed="rId12"/>
-                <a:stretch>
-                  <a:fillRect t="-8333" b="-28333"/>
-                </a:stretch>
-              </a:blipFill>
-            </p:spPr>
-            <p:txBody>
-              <a:bodyPr/>
-              <a:lstStyle/>
-              <a:p>
-                <a:r>
-                  <a:rPr lang="it-IT">
-                    <a:noFill/>
-                  </a:rPr>
-                  <a:t> </a:t>
-                </a:r>
-              </a:p>
-            </p:txBody>
-          </p:sp>
-        </mc:Fallback>
-      </mc:AlternateContent>
       <p:pic>
         <p:nvPicPr>
           <p:cNvPr id="23" name="Immagine 22" descr="Immagine che contiene orologio&#10;&#10;Descrizione generata automaticamente">
@@ -23756,7 +24132,7 @@
           <p:nvPr/>
         </p:nvPicPr>
         <p:blipFill>
-          <a:blip r:embed="rId13">
+          <a:blip r:embed="rId12">
             <a:extLst>
               <a:ext uri="{28A0092B-C50C-407E-A947-70E740481C1C}">
                 <a14:useLocalDpi xmlns:a14="http://schemas.microsoft.com/office/drawing/2010/main" val="0"/>
@@ -23777,6 +24153,35 @@
           </a:prstGeom>
         </p:spPr>
       </p:pic>
+      <p:sp>
+        <p:nvSpPr>
+          <p:cNvPr id="7" name="Segnaposto numero diapositiva 6">
+            <a:extLst>
+              <a:ext uri="{FF2B5EF4-FFF2-40B4-BE49-F238E27FC236}">
+                <a16:creationId xmlns:a16="http://schemas.microsoft.com/office/drawing/2014/main" id="{73AFAA86-F61D-410E-A32E-66EAB9B48873}"/>
+              </a:ext>
+            </a:extLst>
+          </p:cNvPr>
+          <p:cNvSpPr>
+            <a:spLocks noGrp="1"/>
+          </p:cNvSpPr>
+          <p:nvPr>
+            <p:ph type="sldNum" sz="quarter" idx="12"/>
+          </p:nvPr>
+        </p:nvSpPr>
+        <p:spPr/>
+        <p:txBody>
+          <a:bodyPr/>
+          <a:lstStyle/>
+          <a:p>
+            <a:fld id="{4854181D-6920-4594-9A5D-6CE56DC9F8B2}" type="slidenum">
+              <a:rPr lang="en-US" smtClean="0"/>
+              <a:t>9</a:t>
+            </a:fld>
+            <a:endParaRPr lang="en-US"/>
+          </a:p>
+        </p:txBody>
+      </p:sp>
     </p:spTree>
     <p:extLst>
       <p:ext uri="{BB962C8B-B14F-4D97-AF65-F5344CB8AC3E}">

</xml_diff>

<commit_message>
Si trascurano i termini lineari di D(v) piccola modifica sull'ordine delle approssimazioni in D(v)
</commit_message>
<xml_diff>
--- a/presentazione.pptx
+++ b/presentazione.pptx
@@ -275,7 +275,7 @@
           <a:p>
             <a:fld id="{CC770569-2EDB-4B82-806E-B779E2125378}" type="datetimeFigureOut">
               <a:rPr lang="it-IT" smtClean="0"/>
-              <a:t>20/06/2020</a:t>
+              <a:t>21/06/2020</a:t>
             </a:fld>
             <a:endParaRPr lang="it-IT"/>
           </a:p>
@@ -453,7 +453,7 @@
           <a:p>
             <a:fld id="{F3D5F453-40FB-4DD9-B536-90A4813DB008}" type="datetimeFigureOut">
               <a:rPr lang="it-IT" smtClean="0"/>
-              <a:t>20/06/2020</a:t>
+              <a:t>21/06/2020</a:t>
             </a:fld>
             <a:endParaRPr lang="it-IT"/>
           </a:p>
@@ -1036,7 +1036,7 @@
           <a:p>
             <a:fld id="{406A2CA4-CF9F-4D6B-896C-705236384917}" type="datetime1">
               <a:rPr lang="en-US" smtClean="0"/>
-              <a:t>6/20/2020</a:t>
+              <a:t>6/21/2020</a:t>
             </a:fld>
             <a:endParaRPr lang="en-US" dirty="0"/>
           </a:p>
@@ -1495,7 +1495,7 @@
           <a:p>
             <a:fld id="{E4D457AD-4150-436F-9174-87F56CCB1892}" type="datetime1">
               <a:rPr lang="en-US" smtClean="0"/>
-              <a:t>6/20/2020</a:t>
+              <a:t>6/21/2020</a:t>
             </a:fld>
             <a:endParaRPr lang="en-US" dirty="0"/>
           </a:p>
@@ -3942,7 +3942,7 @@
             <p:spPr>
               <a:xfrm>
                 <a:off x="1196502" y="2101134"/>
-                <a:ext cx="6157609" cy="2196435"/>
+                <a:ext cx="6157609" cy="2156360"/>
               </a:xfrm>
               <a:prstGeom prst="rect">
                 <a:avLst/>
@@ -3975,7 +3975,7 @@
                       <a:schemeClr val="bg1"/>
                     </a:solidFill>
                   </a:rPr>
-                  <a:t>Approssimazione ellissoide oblato a sfera liscia</a:t>
+                  <a:t>Si trascurano i termini lineari di D(v)</a:t>
                 </a:r>
               </a:p>
               <a:p>
@@ -3989,7 +3989,7 @@
                       <a:schemeClr val="bg1"/>
                     </a:solidFill>
                   </a:rPr>
-                  <a:t>Si trascurano i termini lineari di D(v)</a:t>
+                  <a:t>Approssimazione ellissoide oblato a sfera liscia</a:t>
                 </a:r>
               </a:p>
               <a:p>
@@ -4263,7 +4263,7 @@
             <p:spPr>
               <a:xfrm>
                 <a:off x="1196502" y="2101134"/>
-                <a:ext cx="6157609" cy="2196435"/>
+                <a:ext cx="6157609" cy="2156360"/>
               </a:xfrm>
               <a:prstGeom prst="rect">
                 <a:avLst/>
@@ -4271,7 +4271,7 @@
               <a:blipFill>
                 <a:blip r:embed="rId4"/>
                 <a:stretch>
-                  <a:fillRect l="-891" t="-1389" r="-594" b="-1944"/>
+                  <a:fillRect l="-891" t="-1416" r="-594" b="-3966"/>
                 </a:stretch>
               </a:blipFill>
             </p:spPr>
@@ -15249,8 +15249,8 @@
           </p:sp>
         </mc:Fallback>
       </mc:AlternateContent>
-      <mc:AlternateContent xmlns:mc="http://schemas.openxmlformats.org/markup-compatibility/2006">
-        <mc:Choice xmlns:a14="http://schemas.microsoft.com/office/drawing/2010/main" Requires="a14">
+      <mc:AlternateContent xmlns:mc="http://schemas.openxmlformats.org/markup-compatibility/2006" xmlns:a14="http://schemas.microsoft.com/office/drawing/2010/main">
+        <mc:Choice Requires="a14">
           <p:sp>
             <p:nvSpPr>
               <p:cNvPr id="20" name="CasellaDiTesto 19">
@@ -15384,7 +15384,7 @@
             </p:txBody>
           </p:sp>
         </mc:Choice>
-        <mc:Fallback>
+        <mc:Fallback xmlns="">
           <p:sp>
             <p:nvSpPr>
               <p:cNvPr id="20" name="CasellaDiTesto 19">
@@ -15429,8 +15429,8 @@
           </p:sp>
         </mc:Fallback>
       </mc:AlternateContent>
-      <mc:AlternateContent xmlns:mc="http://schemas.openxmlformats.org/markup-compatibility/2006">
-        <mc:Choice xmlns:a14="http://schemas.microsoft.com/office/drawing/2010/main" Requires="a14">
+      <mc:AlternateContent xmlns:mc="http://schemas.openxmlformats.org/markup-compatibility/2006" xmlns:a14="http://schemas.microsoft.com/office/drawing/2010/main">
+        <mc:Choice Requires="a14">
           <p:sp>
             <p:nvSpPr>
               <p:cNvPr id="21" name="CasellaDiTesto 20">
@@ -15668,7 +15668,7 @@
             </p:txBody>
           </p:sp>
         </mc:Choice>
-        <mc:Fallback>
+        <mc:Fallback xmlns="">
           <p:sp>
             <p:nvSpPr>
               <p:cNvPr id="21" name="CasellaDiTesto 20">
@@ -15713,8 +15713,8 @@
           </p:sp>
         </mc:Fallback>
       </mc:AlternateContent>
-      <mc:AlternateContent xmlns:mc="http://schemas.openxmlformats.org/markup-compatibility/2006">
-        <mc:Choice xmlns:a14="http://schemas.microsoft.com/office/drawing/2010/main" Requires="a14">
+      <mc:AlternateContent xmlns:mc="http://schemas.openxmlformats.org/markup-compatibility/2006" xmlns:a14="http://schemas.microsoft.com/office/drawing/2010/main">
+        <mc:Choice Requires="a14">
           <p:sp>
             <p:nvSpPr>
               <p:cNvPr id="24" name="CasellaDiTesto 23">
@@ -15993,17 +15993,7 @@
                         <a:latin typeface="Cambria Math" panose="02040503050406030204" pitchFamily="18" charset="0"/>
                         <a:ea typeface="Cambria Math" panose="02040503050406030204" pitchFamily="18" charset="0"/>
                       </a:rPr>
-                      <m:t>=0,003</m:t>
-                    </m:r>
-                    <m:r>
-                      <a:rPr lang="it-IT" b="0" i="1" smtClean="0">
-                        <a:solidFill>
-                          <a:schemeClr val="bg1"/>
-                        </a:solidFill>
-                        <a:latin typeface="Cambria Math" panose="02040503050406030204" pitchFamily="18" charset="0"/>
-                        <a:ea typeface="Cambria Math" panose="02040503050406030204" pitchFamily="18" charset="0"/>
-                      </a:rPr>
-                      <m:t>7 </m:t>
+                      <m:t>=0,0037 </m:t>
                     </m:r>
                     <m:f>
                       <m:fPr>
@@ -16057,7 +16047,7 @@
             </p:txBody>
           </p:sp>
         </mc:Choice>
-        <mc:Fallback>
+        <mc:Fallback xmlns="">
           <p:sp>
             <p:nvSpPr>
               <p:cNvPr id="24" name="CasellaDiTesto 23">
@@ -20565,6 +20555,54 @@
           </a:prstGeom>
         </p:spPr>
       </p:pic>
+      <p:sp>
+        <p:nvSpPr>
+          <p:cNvPr id="15" name="Rettangolo 14">
+            <a:extLst>
+              <a:ext uri="{FF2B5EF4-FFF2-40B4-BE49-F238E27FC236}">
+                <a16:creationId xmlns:a16="http://schemas.microsoft.com/office/drawing/2014/main" id="{AD7051F9-5E8F-4736-B27B-971D9BBAB29C}"/>
+              </a:ext>
+            </a:extLst>
+          </p:cNvPr>
+          <p:cNvSpPr/>
+          <p:nvPr/>
+        </p:nvSpPr>
+        <p:spPr>
+          <a:xfrm>
+            <a:off x="918814" y="1181715"/>
+            <a:ext cx="1025839" cy="735261"/>
+          </a:xfrm>
+          <a:prstGeom prst="rect">
+            <a:avLst/>
+          </a:prstGeom>
+          <a:noFill/>
+          <a:ln w="25400"/>
+        </p:spPr>
+        <p:style>
+          <a:lnRef idx="2">
+            <a:schemeClr val="accent1">
+              <a:shade val="50000"/>
+            </a:schemeClr>
+          </a:lnRef>
+          <a:fillRef idx="1">
+            <a:schemeClr val="accent1"/>
+          </a:fillRef>
+          <a:effectRef idx="0">
+            <a:schemeClr val="accent1"/>
+          </a:effectRef>
+          <a:fontRef idx="minor">
+            <a:schemeClr val="lt1"/>
+          </a:fontRef>
+        </p:style>
+        <p:txBody>
+          <a:bodyPr rtlCol="0" anchor="ctr"/>
+          <a:lstStyle/>
+          <a:p>
+            <a:pPr algn="ctr"/>
+            <a:endParaRPr lang="it-IT"/>
+          </a:p>
+        </p:txBody>
+      </p:sp>
     </p:spTree>
     <p:extLst>
       <p:ext uri="{BB962C8B-B14F-4D97-AF65-F5344CB8AC3E}">
@@ -21152,8 +21190,8 @@
           </a:p>
         </p:txBody>
       </p:sp>
-      <mc:AlternateContent xmlns:mc="http://schemas.openxmlformats.org/markup-compatibility/2006">
-        <mc:Choice xmlns:a14="http://schemas.microsoft.com/office/drawing/2010/main" Requires="a14">
+      <mc:AlternateContent xmlns:mc="http://schemas.openxmlformats.org/markup-compatibility/2006" xmlns:a14="http://schemas.microsoft.com/office/drawing/2010/main">
+        <mc:Choice Requires="a14">
           <p:sp>
             <p:nvSpPr>
               <p:cNvPr id="6" name="Rettangolo 5">
@@ -21322,7 +21360,7 @@
             </p:txBody>
           </p:sp>
         </mc:Choice>
-        <mc:Fallback>
+        <mc:Fallback xmlns="">
           <p:sp>
             <p:nvSpPr>
               <p:cNvPr id="6" name="Rettangolo 5">
@@ -23885,8 +23923,8 @@
           </a:p>
         </p:txBody>
       </p:sp>
-      <mc:AlternateContent xmlns:mc="http://schemas.openxmlformats.org/markup-compatibility/2006">
-        <mc:Choice xmlns:a14="http://schemas.microsoft.com/office/drawing/2010/main" Requires="a14">
+      <mc:AlternateContent xmlns:mc="http://schemas.openxmlformats.org/markup-compatibility/2006" xmlns:a14="http://schemas.microsoft.com/office/drawing/2010/main">
+        <mc:Choice Requires="a14">
           <p:sp>
             <p:nvSpPr>
               <p:cNvPr id="10" name="Rettangolo 9">
@@ -24072,7 +24110,7 @@
             </p:txBody>
           </p:sp>
         </mc:Choice>
-        <mc:Fallback>
+        <mc:Fallback xmlns="">
           <p:sp>
             <p:nvSpPr>
               <p:cNvPr id="10" name="Rettangolo 9">

</xml_diff>

<commit_message>
eliminata l'ultima slide Please enter the commit message for your changes. Lines starting
</commit_message>
<xml_diff>
--- a/presentazione.pptx
+++ b/presentazione.pptx
@@ -5,10 +5,10 @@
     <p:sldMasterId id="2147483716" r:id="rId1"/>
   </p:sldMasterIdLst>
   <p:notesMasterIdLst>
-    <p:notesMasterId r:id="rId30"/>
+    <p:notesMasterId r:id="rId29"/>
   </p:notesMasterIdLst>
   <p:handoutMasterIdLst>
-    <p:handoutMasterId r:id="rId31"/>
+    <p:handoutMasterId r:id="rId30"/>
   </p:handoutMasterIdLst>
   <p:sldIdLst>
     <p:sldId id="256" r:id="rId2"/>
@@ -38,7 +38,6 @@
     <p:sldId id="298" r:id="rId26"/>
     <p:sldId id="303" r:id="rId27"/>
     <p:sldId id="301" r:id="rId28"/>
-    <p:sldId id="302" r:id="rId29"/>
   </p:sldIdLst>
   <p:sldSz cx="12192000" cy="6858000"/>
   <p:notesSz cx="6858000" cy="9144000"/>
@@ -169,7 +168,6 @@
             <p14:sldId id="298"/>
             <p14:sldId id="303"/>
             <p14:sldId id="301"/>
-            <p14:sldId id="302"/>
           </p14:sldIdLst>
         </p14:section>
       </p14:sectionLst>
@@ -3925,8 +3923,8 @@
           </a:prstGeom>
         </p:spPr>
       </p:pic>
-      <mc:AlternateContent xmlns:mc="http://schemas.openxmlformats.org/markup-compatibility/2006">
-        <mc:Choice xmlns:a14="http://schemas.microsoft.com/office/drawing/2010/main" Requires="a14">
+      <mc:AlternateContent xmlns:mc="http://schemas.openxmlformats.org/markup-compatibility/2006" xmlns:a14="http://schemas.microsoft.com/office/drawing/2010/main">
+        <mc:Choice Requires="a14">
           <p:sp>
             <p:nvSpPr>
               <p:cNvPr id="7" name="CasellaDiTesto 6">
@@ -4245,7 +4243,7 @@
             </p:txBody>
           </p:sp>
         </mc:Choice>
-        <mc:Fallback>
+        <mc:Fallback xmlns="">
           <p:sp>
             <p:nvSpPr>
               <p:cNvPr id="7" name="CasellaDiTesto 6">
@@ -11797,181 +11795,6 @@
     <p:extLst>
       <p:ext uri="{BB962C8B-B14F-4D97-AF65-F5344CB8AC3E}">
         <p14:creationId xmlns:p14="http://schemas.microsoft.com/office/powerpoint/2010/main" val="1038073729"/>
-      </p:ext>
-    </p:extLst>
-  </p:cSld>
-  <p:clrMapOvr>
-    <a:masterClrMapping/>
-  </p:clrMapOvr>
-</p:sld>
-</file>
-
-<file path=ppt/slides/slide28.xml><?xml version="1.0" encoding="utf-8"?>
-<p:sld xmlns:a="http://schemas.openxmlformats.org/drawingml/2006/main" xmlns:r="http://schemas.openxmlformats.org/officeDocument/2006/relationships" xmlns:p="http://schemas.openxmlformats.org/presentationml/2006/main" showMasterSp="0">
-  <p:cSld>
-    <p:bg>
-      <p:bgPr>
-        <a:blipFill dpi="0" rotWithShape="1">
-          <a:blip r:embed="rId2">
-            <a:lum/>
-          </a:blip>
-          <a:srcRect/>
-          <a:stretch>
-            <a:fillRect/>
-          </a:stretch>
-        </a:blipFill>
-        <a:effectLst/>
-      </p:bgPr>
-    </p:bg>
-    <p:spTree>
-      <p:nvGrpSpPr>
-        <p:cNvPr id="1" name=""/>
-        <p:cNvGrpSpPr/>
-        <p:nvPr/>
-      </p:nvGrpSpPr>
-      <p:grpSpPr>
-        <a:xfrm>
-          <a:off x="0" y="0"/>
-          <a:ext cx="0" cy="0"/>
-          <a:chOff x="0" y="0"/>
-          <a:chExt cx="0" cy="0"/>
-        </a:xfrm>
-      </p:grpSpPr>
-      <p:sp>
-        <p:nvSpPr>
-          <p:cNvPr id="4" name="Segnaposto piè di pagina 3">
-            <a:extLst>
-              <a:ext uri="{FF2B5EF4-FFF2-40B4-BE49-F238E27FC236}">
-                <a16:creationId xmlns:a16="http://schemas.microsoft.com/office/drawing/2014/main" id="{4E362125-2F83-4266-AB8C-336E9ADDBB86}"/>
-              </a:ext>
-            </a:extLst>
-          </p:cNvPr>
-          <p:cNvSpPr>
-            <a:spLocks noGrp="1"/>
-          </p:cNvSpPr>
-          <p:nvPr>
-            <p:ph type="ftr" sz="quarter" idx="11"/>
-          </p:nvPr>
-        </p:nvSpPr>
-        <p:spPr>
-          <a:xfrm>
-            <a:off x="-231742" y="6492875"/>
-            <a:ext cx="4114800" cy="365125"/>
-          </a:xfrm>
-        </p:spPr>
-        <p:txBody>
-          <a:bodyPr/>
-          <a:lstStyle/>
-          <a:p>
-            <a:endParaRPr lang="en-US" i="1" dirty="0">
-              <a:solidFill>
-                <a:schemeClr val="bg1"/>
-              </a:solidFill>
-            </a:endParaRPr>
-          </a:p>
-        </p:txBody>
-      </p:sp>
-      <p:sp>
-        <p:nvSpPr>
-          <p:cNvPr id="11" name="Rettangolo 10">
-            <a:extLst>
-              <a:ext uri="{FF2B5EF4-FFF2-40B4-BE49-F238E27FC236}">
-                <a16:creationId xmlns:a16="http://schemas.microsoft.com/office/drawing/2014/main" id="{DE43AB90-63F1-413E-8732-29F127F1CF7E}"/>
-              </a:ext>
-            </a:extLst>
-          </p:cNvPr>
-          <p:cNvSpPr/>
-          <p:nvPr/>
-        </p:nvSpPr>
-        <p:spPr>
-          <a:xfrm>
-            <a:off x="337221" y="428665"/>
-            <a:ext cx="5462906" cy="707886"/>
-          </a:xfrm>
-          <a:prstGeom prst="rect">
-            <a:avLst/>
-          </a:prstGeom>
-        </p:spPr>
-        <p:txBody>
-          <a:bodyPr wrap="none">
-            <a:spAutoFit/>
-          </a:bodyPr>
-          <a:lstStyle/>
-          <a:p>
-            <a:r>
-              <a:rPr lang="it-IT" sz="4000" b="1" dirty="0">
-                <a:solidFill>
-                  <a:schemeClr val="bg1"/>
-                </a:solidFill>
-              </a:rPr>
-              <a:t>Integrazione parziale</a:t>
-            </a:r>
-          </a:p>
-        </p:txBody>
-      </p:sp>
-      <p:pic>
-        <p:nvPicPr>
-          <p:cNvPr id="5" name="Immagine 4">
-            <a:extLst>
-              <a:ext uri="{FF2B5EF4-FFF2-40B4-BE49-F238E27FC236}">
-                <a16:creationId xmlns:a16="http://schemas.microsoft.com/office/drawing/2014/main" id="{CBEA41C4-B086-45E2-81A2-245B126A12E6}"/>
-              </a:ext>
-            </a:extLst>
-          </p:cNvPr>
-          <p:cNvPicPr>
-            <a:picLocks noChangeAspect="1"/>
-          </p:cNvPicPr>
-          <p:nvPr/>
-        </p:nvPicPr>
-        <p:blipFill>
-          <a:blip r:embed="rId3"/>
-          <a:stretch>
-            <a:fillRect/>
-          </a:stretch>
-        </p:blipFill>
-        <p:spPr>
-          <a:xfrm>
-            <a:off x="1906621" y="1642774"/>
-            <a:ext cx="8378757" cy="4343877"/>
-          </a:xfrm>
-          <a:prstGeom prst="rect">
-            <a:avLst/>
-          </a:prstGeom>
-        </p:spPr>
-      </p:pic>
-      <p:sp>
-        <p:nvSpPr>
-          <p:cNvPr id="2" name="Segnaposto numero diapositiva 1">
-            <a:extLst>
-              <a:ext uri="{FF2B5EF4-FFF2-40B4-BE49-F238E27FC236}">
-                <a16:creationId xmlns:a16="http://schemas.microsoft.com/office/drawing/2014/main" id="{2D93E094-05D2-4BA6-88B6-09B7A104FE2E}"/>
-              </a:ext>
-            </a:extLst>
-          </p:cNvPr>
-          <p:cNvSpPr>
-            <a:spLocks noGrp="1"/>
-          </p:cNvSpPr>
-          <p:nvPr>
-            <p:ph type="sldNum" sz="quarter" idx="12"/>
-          </p:nvPr>
-        </p:nvSpPr>
-        <p:spPr/>
-        <p:txBody>
-          <a:bodyPr/>
-          <a:lstStyle/>
-          <a:p>
-            <a:fld id="{4854181D-6920-4594-9A5D-6CE56DC9F8B2}" type="slidenum">
-              <a:rPr lang="en-US" smtClean="0"/>
-              <a:t>28</a:t>
-            </a:fld>
-            <a:endParaRPr lang="en-US"/>
-          </a:p>
-        </p:txBody>
-      </p:sp>
-    </p:spTree>
-    <p:extLst>
-      <p:ext uri="{BB962C8B-B14F-4D97-AF65-F5344CB8AC3E}">
-        <p14:creationId xmlns:p14="http://schemas.microsoft.com/office/powerpoint/2010/main" val="3595974915"/>
       </p:ext>
     </p:extLst>
   </p:cSld>
@@ -17800,7 +17623,7 @@
         </p:nvCxnSpPr>
         <p:spPr>
           <a:xfrm>
-            <a:off x="10292484" y="5289318"/>
+            <a:off x="10397376" y="5274430"/>
             <a:ext cx="486733" cy="8849"/>
           </a:xfrm>
           <a:prstGeom prst="straightConnector1">
@@ -17839,7 +17662,7 @@
         </p:nvSpPr>
         <p:spPr>
           <a:xfrm>
-            <a:off x="10663758" y="5050996"/>
+            <a:off x="10715628" y="5053101"/>
             <a:ext cx="1218146" cy="577081"/>
           </a:xfrm>
           <a:prstGeom prst="rect">
@@ -17878,8 +17701,8 @@
           </a:p>
         </p:txBody>
       </p:sp>
-      <mc:AlternateContent xmlns:mc="http://schemas.openxmlformats.org/markup-compatibility/2006" xmlns:a14="http://schemas.microsoft.com/office/drawing/2010/main">
-        <mc:Choice Requires="a14">
+      <mc:AlternateContent xmlns:mc="http://schemas.openxmlformats.org/markup-compatibility/2006">
+        <mc:Choice xmlns:a14="http://schemas.microsoft.com/office/drawing/2010/main" Requires="a14">
           <p:sp>
             <p:nvSpPr>
               <p:cNvPr id="2" name="CasellaDiTesto 1">
@@ -18247,7 +18070,7 @@
             </p:txBody>
           </p:sp>
         </mc:Choice>
-        <mc:Fallback xmlns="">
+        <mc:Fallback>
           <p:sp>
             <p:nvSpPr>
               <p:cNvPr id="2" name="CasellaDiTesto 1">

</xml_diff>

<commit_message>
corretto il segno sulla T dei thrusters
</commit_message>
<xml_diff>
--- a/presentazione.pptx
+++ b/presentazione.pptx
@@ -4835,6 +4835,54 @@
           </a:p>
         </p:txBody>
       </p:sp>
+      <p:sp>
+        <p:nvSpPr>
+          <p:cNvPr id="14" name="Rettangolo 13">
+            <a:extLst>
+              <a:ext uri="{FF2B5EF4-FFF2-40B4-BE49-F238E27FC236}">
+                <a16:creationId xmlns:a16="http://schemas.microsoft.com/office/drawing/2014/main" id="{88C7552E-B4BB-4DCA-9805-B3579B317E11}"/>
+              </a:ext>
+            </a:extLst>
+          </p:cNvPr>
+          <p:cNvSpPr/>
+          <p:nvPr/>
+        </p:nvSpPr>
+        <p:spPr>
+          <a:xfrm>
+            <a:off x="1126055" y="3939754"/>
+            <a:ext cx="2913285" cy="646331"/>
+          </a:xfrm>
+          <a:prstGeom prst="rect">
+            <a:avLst/>
+          </a:prstGeom>
+          <a:noFill/>
+          <a:ln w="28575"/>
+        </p:spPr>
+        <p:style>
+          <a:lnRef idx="2">
+            <a:schemeClr val="accent1">
+              <a:shade val="50000"/>
+            </a:schemeClr>
+          </a:lnRef>
+          <a:fillRef idx="1">
+            <a:schemeClr val="accent1"/>
+          </a:fillRef>
+          <a:effectRef idx="0">
+            <a:schemeClr val="accent1"/>
+          </a:effectRef>
+          <a:fontRef idx="minor">
+            <a:schemeClr val="lt1"/>
+          </a:fontRef>
+        </p:style>
+        <p:txBody>
+          <a:bodyPr rtlCol="0" anchor="ctr"/>
+          <a:lstStyle/>
+          <a:p>
+            <a:pPr algn="ctr"/>
+            <a:endParaRPr lang="it-IT"/>
+          </a:p>
+        </p:txBody>
+      </p:sp>
     </p:spTree>
     <p:extLst>
       <p:ext uri="{BB962C8B-B14F-4D97-AF65-F5344CB8AC3E}">
@@ -15252,8 +15300,8 @@
           </p:sp>
         </mc:Fallback>
       </mc:AlternateContent>
-      <mc:AlternateContent xmlns:mc="http://schemas.openxmlformats.org/markup-compatibility/2006" xmlns:a14="http://schemas.microsoft.com/office/drawing/2010/main">
-        <mc:Choice Requires="a14">
+      <mc:AlternateContent xmlns:mc="http://schemas.openxmlformats.org/markup-compatibility/2006">
+        <mc:Choice xmlns:a14="http://schemas.microsoft.com/office/drawing/2010/main" Requires="a14">
           <p:sp>
             <p:nvSpPr>
               <p:cNvPr id="21" name="CasellaDiTesto 20">
@@ -15382,7 +15430,7 @@
                           </a:solidFill>
                           <a:latin typeface="Cambria Math" panose="02040503050406030204" pitchFamily="18" charset="0"/>
                         </a:rPr>
-                        <m:t>+</m:t>
+                        <m:t>−</m:t>
                       </m:r>
                       <m:sSub>
                         <m:sSubPr>
@@ -15491,7 +15539,7 @@
             </p:txBody>
           </p:sp>
         </mc:Choice>
-        <mc:Fallback xmlns="">
+        <mc:Fallback>
           <p:sp>
             <p:nvSpPr>
               <p:cNvPr id="21" name="CasellaDiTesto 20">
@@ -17701,8 +17749,8 @@
           </a:p>
         </p:txBody>
       </p:sp>
-      <mc:AlternateContent xmlns:mc="http://schemas.openxmlformats.org/markup-compatibility/2006">
-        <mc:Choice xmlns:a14="http://schemas.microsoft.com/office/drawing/2010/main" Requires="a14">
+      <mc:AlternateContent xmlns:mc="http://schemas.openxmlformats.org/markup-compatibility/2006" xmlns:a14="http://schemas.microsoft.com/office/drawing/2010/main">
+        <mc:Choice Requires="a14">
           <p:sp>
             <p:nvSpPr>
               <p:cNvPr id="2" name="CasellaDiTesto 1">
@@ -18070,7 +18118,7 @@
             </p:txBody>
           </p:sp>
         </mc:Choice>
-        <mc:Fallback>
+        <mc:Fallback xmlns="">
           <p:sp>
             <p:nvSpPr>
               <p:cNvPr id="2" name="CasellaDiTesto 1">

</xml_diff>